<commit_message>
Rescaled to the printing size
</commit_message>
<xml_diff>
--- a/poster.pptx
+++ b/poster.pptx
@@ -11,20 +11,20 @@
     <p:sldId id="262" r:id="rId2"/>
     <p:sldId id="263" r:id="rId3"/>
   </p:sldIdLst>
-  <p:sldSz cx="43891200" cy="32918400"/>
+  <p:sldSz cx="40233600" cy="31089600"/>
   <p:notesSz cx="6858000" cy="9144000"/>
   <p:defaultTextStyle>
     <a:defPPr>
       <a:defRPr lang="en-US"/>
     </a:defPPr>
-    <a:lvl1pPr algn="l" defTabSz="2193925" rtl="0" fontAlgn="base">
+    <a:lvl1pPr algn="l" defTabSz="2035657" rtl="0" fontAlgn="base">
       <a:spcBef>
         <a:spcPct val="0"/>
       </a:spcBef>
       <a:spcAft>
         <a:spcPct val="0"/>
       </a:spcAft>
-      <a:defRPr sz="8600" kern="1200">
+      <a:defRPr sz="7980" kern="1200">
         <a:solidFill>
           <a:schemeClr val="tx1"/>
         </a:solidFill>
@@ -33,14 +33,14 @@
         <a:cs typeface="+mn-cs"/>
       </a:defRPr>
     </a:lvl1pPr>
-    <a:lvl2pPr marL="2193925" indent="-1736725" algn="l" defTabSz="2193925" rtl="0" fontAlgn="base">
+    <a:lvl2pPr marL="2035657" indent="-1611439" algn="l" defTabSz="2035657" rtl="0" fontAlgn="base">
       <a:spcBef>
         <a:spcPct val="0"/>
       </a:spcBef>
       <a:spcAft>
         <a:spcPct val="0"/>
       </a:spcAft>
-      <a:defRPr sz="8600" kern="1200">
+      <a:defRPr sz="7980" kern="1200">
         <a:solidFill>
           <a:schemeClr val="tx1"/>
         </a:solidFill>
@@ -49,14 +49,14 @@
         <a:cs typeface="+mn-cs"/>
       </a:defRPr>
     </a:lvl2pPr>
-    <a:lvl3pPr marL="4387850" indent="-3473450" algn="l" defTabSz="2193925" rtl="0" fontAlgn="base">
+    <a:lvl3pPr marL="4071315" indent="-3222879" algn="l" defTabSz="2035657" rtl="0" fontAlgn="base">
       <a:spcBef>
         <a:spcPct val="0"/>
       </a:spcBef>
       <a:spcAft>
         <a:spcPct val="0"/>
       </a:spcAft>
-      <a:defRPr sz="8600" kern="1200">
+      <a:defRPr sz="7980" kern="1200">
         <a:solidFill>
           <a:schemeClr val="tx1"/>
         </a:solidFill>
@@ -65,14 +65,14 @@
         <a:cs typeface="+mn-cs"/>
       </a:defRPr>
     </a:lvl3pPr>
-    <a:lvl4pPr marL="6583363" indent="-5211763" algn="l" defTabSz="2193925" rtl="0" fontAlgn="base">
+    <a:lvl4pPr marL="6108446" indent="-4835792" algn="l" defTabSz="2035657" rtl="0" fontAlgn="base">
       <a:spcBef>
         <a:spcPct val="0"/>
       </a:spcBef>
       <a:spcAft>
         <a:spcPct val="0"/>
       </a:spcAft>
-      <a:defRPr sz="8600" kern="1200">
+      <a:defRPr sz="7980" kern="1200">
         <a:solidFill>
           <a:schemeClr val="tx1"/>
         </a:solidFill>
@@ -81,14 +81,14 @@
         <a:cs typeface="+mn-cs"/>
       </a:defRPr>
     </a:lvl4pPr>
-    <a:lvl5pPr marL="8777288" indent="-6948488" algn="l" defTabSz="2193925" rtl="0" fontAlgn="base">
+    <a:lvl5pPr marL="8144103" indent="-6447231" algn="l" defTabSz="2035657" rtl="0" fontAlgn="base">
       <a:spcBef>
         <a:spcPct val="0"/>
       </a:spcBef>
       <a:spcAft>
         <a:spcPct val="0"/>
       </a:spcAft>
-      <a:defRPr sz="8600" kern="1200">
+      <a:defRPr sz="7980" kern="1200">
         <a:solidFill>
           <a:schemeClr val="tx1"/>
         </a:solidFill>
@@ -97,8 +97,8 @@
         <a:cs typeface="+mn-cs"/>
       </a:defRPr>
     </a:lvl5pPr>
-    <a:lvl6pPr marL="2286000" algn="l" defTabSz="914400" rtl="0" eaLnBrk="1" latinLnBrk="0" hangingPunct="1">
-      <a:defRPr sz="8600" kern="1200">
+    <a:lvl6pPr marL="2121090" algn="l" defTabSz="848436" rtl="0" eaLnBrk="1" latinLnBrk="0" hangingPunct="1">
+      <a:defRPr sz="7980" kern="1200">
         <a:solidFill>
           <a:schemeClr val="tx1"/>
         </a:solidFill>
@@ -107,8 +107,8 @@
         <a:cs typeface="+mn-cs"/>
       </a:defRPr>
     </a:lvl6pPr>
-    <a:lvl7pPr marL="2743200" algn="l" defTabSz="914400" rtl="0" eaLnBrk="1" latinLnBrk="0" hangingPunct="1">
-      <a:defRPr sz="8600" kern="1200">
+    <a:lvl7pPr marL="2545310" algn="l" defTabSz="848436" rtl="0" eaLnBrk="1" latinLnBrk="0" hangingPunct="1">
+      <a:defRPr sz="7980" kern="1200">
         <a:solidFill>
           <a:schemeClr val="tx1"/>
         </a:solidFill>
@@ -117,8 +117,8 @@
         <a:cs typeface="+mn-cs"/>
       </a:defRPr>
     </a:lvl7pPr>
-    <a:lvl8pPr marL="3200400" algn="l" defTabSz="914400" rtl="0" eaLnBrk="1" latinLnBrk="0" hangingPunct="1">
-      <a:defRPr sz="8600" kern="1200">
+    <a:lvl8pPr marL="2969525" algn="l" defTabSz="848436" rtl="0" eaLnBrk="1" latinLnBrk="0" hangingPunct="1">
+      <a:defRPr sz="7980" kern="1200">
         <a:solidFill>
           <a:schemeClr val="tx1"/>
         </a:solidFill>
@@ -127,8 +127,8 @@
         <a:cs typeface="+mn-cs"/>
       </a:defRPr>
     </a:lvl8pPr>
-    <a:lvl9pPr marL="3657600" algn="l" defTabSz="914400" rtl="0" eaLnBrk="1" latinLnBrk="0" hangingPunct="1">
-      <a:defRPr sz="8600" kern="1200">
+    <a:lvl9pPr marL="3393745" algn="l" defTabSz="848436" rtl="0" eaLnBrk="1" latinLnBrk="0" hangingPunct="1">
+      <a:defRPr sz="7980" kern="1200">
         <a:solidFill>
           <a:schemeClr val="tx1"/>
         </a:solidFill>
@@ -141,12 +141,12 @@
   <p:extLst>
     <p:ext uri="{EFAFB233-063F-42B5-8137-9DF3F51BA10A}">
       <p15:sldGuideLst xmlns:p15="http://schemas.microsoft.com/office/powerpoint/2012/main">
-        <p15:guide id="1" orient="horz" pos="10368">
+        <p15:guide id="1" orient="horz" pos="9792" userDrawn="1">
           <p15:clr>
             <a:srgbClr val="A4A3A4"/>
           </p15:clr>
         </p15:guide>
-        <p15:guide id="2" pos="13824">
+        <p15:guide id="2" pos="12672" userDrawn="1">
           <p15:clr>
             <a:srgbClr val="A4A3A4"/>
           </p15:clr>
@@ -275,8 +275,8 @@
         </p:nvSpPr>
         <p:spPr>
           <a:xfrm>
-            <a:off x="1143000" y="685800"/>
-            <a:ext cx="4572000" cy="3429000"/>
+            <a:off x="1209675" y="685800"/>
+            <a:ext cx="4438650" cy="3429000"/>
           </a:xfrm>
           <a:prstGeom prst="rect">
             <a:avLst/>
@@ -453,14 +453,14 @@
   </p:cSld>
   <p:clrMap bg1="lt1" tx1="dk1" bg2="lt2" tx2="dk2" accent1="accent1" accent2="accent2" accent3="accent3" accent4="accent4" accent5="accent5" accent6="accent6" hlink="hlink" folHlink="folHlink"/>
   <p:notesStyle>
-    <a:lvl1pPr algn="l" defTabSz="457200" rtl="0" eaLnBrk="0" fontAlgn="base" hangingPunct="0">
+    <a:lvl1pPr algn="l" defTabSz="424219" rtl="0" eaLnBrk="0" fontAlgn="base" hangingPunct="0">
       <a:spcBef>
         <a:spcPct val="30000"/>
       </a:spcBef>
       <a:spcAft>
         <a:spcPct val="0"/>
       </a:spcAft>
-      <a:defRPr sz="1200" kern="1200">
+      <a:defRPr sz="1114" kern="1200">
         <a:solidFill>
           <a:schemeClr val="tx1"/>
         </a:solidFill>
@@ -469,14 +469,14 @@
         <a:cs typeface="ＭＳ Ｐゴシック" pitchFamily="-108" charset="-128"/>
       </a:defRPr>
     </a:lvl1pPr>
-    <a:lvl2pPr marL="457200" algn="l" defTabSz="457200" rtl="0" eaLnBrk="0" fontAlgn="base" hangingPunct="0">
+    <a:lvl2pPr marL="424219" algn="l" defTabSz="424219" rtl="0" eaLnBrk="0" fontAlgn="base" hangingPunct="0">
       <a:spcBef>
         <a:spcPct val="30000"/>
       </a:spcBef>
       <a:spcAft>
         <a:spcPct val="0"/>
       </a:spcAft>
-      <a:defRPr sz="1200" kern="1200">
+      <a:defRPr sz="1114" kern="1200">
         <a:solidFill>
           <a:schemeClr val="tx1"/>
         </a:solidFill>
@@ -485,14 +485,14 @@
         <a:cs typeface="+mn-cs"/>
       </a:defRPr>
     </a:lvl2pPr>
-    <a:lvl3pPr marL="914400" algn="l" defTabSz="457200" rtl="0" eaLnBrk="0" fontAlgn="base" hangingPunct="0">
+    <a:lvl3pPr marL="848436" algn="l" defTabSz="424219" rtl="0" eaLnBrk="0" fontAlgn="base" hangingPunct="0">
       <a:spcBef>
         <a:spcPct val="30000"/>
       </a:spcBef>
       <a:spcAft>
         <a:spcPct val="0"/>
       </a:spcAft>
-      <a:defRPr sz="1200" kern="1200">
+      <a:defRPr sz="1114" kern="1200">
         <a:solidFill>
           <a:schemeClr val="tx1"/>
         </a:solidFill>
@@ -501,14 +501,14 @@
         <a:cs typeface="+mn-cs"/>
       </a:defRPr>
     </a:lvl3pPr>
-    <a:lvl4pPr marL="1371600" algn="l" defTabSz="457200" rtl="0" eaLnBrk="0" fontAlgn="base" hangingPunct="0">
+    <a:lvl4pPr marL="1272654" algn="l" defTabSz="424219" rtl="0" eaLnBrk="0" fontAlgn="base" hangingPunct="0">
       <a:spcBef>
         <a:spcPct val="30000"/>
       </a:spcBef>
       <a:spcAft>
         <a:spcPct val="0"/>
       </a:spcAft>
-      <a:defRPr sz="1200" kern="1200">
+      <a:defRPr sz="1114" kern="1200">
         <a:solidFill>
           <a:schemeClr val="tx1"/>
         </a:solidFill>
@@ -517,14 +517,14 @@
         <a:cs typeface="+mn-cs"/>
       </a:defRPr>
     </a:lvl4pPr>
-    <a:lvl5pPr marL="1828800" algn="l" defTabSz="457200" rtl="0" eaLnBrk="0" fontAlgn="base" hangingPunct="0">
+    <a:lvl5pPr marL="1696872" algn="l" defTabSz="424219" rtl="0" eaLnBrk="0" fontAlgn="base" hangingPunct="0">
       <a:spcBef>
         <a:spcPct val="30000"/>
       </a:spcBef>
       <a:spcAft>
         <a:spcPct val="0"/>
       </a:spcAft>
-      <a:defRPr sz="1200" kern="1200">
+      <a:defRPr sz="1114" kern="1200">
         <a:solidFill>
           <a:schemeClr val="tx1"/>
         </a:solidFill>
@@ -533,8 +533,8 @@
         <a:cs typeface="+mn-cs"/>
       </a:defRPr>
     </a:lvl5pPr>
-    <a:lvl6pPr marL="2286000" algn="l" defTabSz="457200" rtl="0" eaLnBrk="1" latinLnBrk="0" hangingPunct="1">
-      <a:defRPr sz="1200" kern="1200">
+    <a:lvl6pPr marL="2121090" algn="l" defTabSz="424219" rtl="0" eaLnBrk="1" latinLnBrk="0" hangingPunct="1">
+      <a:defRPr sz="1114" kern="1200">
         <a:solidFill>
           <a:schemeClr val="tx1"/>
         </a:solidFill>
@@ -543,8 +543,8 @@
         <a:cs typeface="+mn-cs"/>
       </a:defRPr>
     </a:lvl6pPr>
-    <a:lvl7pPr marL="2743200" algn="l" defTabSz="457200" rtl="0" eaLnBrk="1" latinLnBrk="0" hangingPunct="1">
-      <a:defRPr sz="1200" kern="1200">
+    <a:lvl7pPr marL="2545310" algn="l" defTabSz="424219" rtl="0" eaLnBrk="1" latinLnBrk="0" hangingPunct="1">
+      <a:defRPr sz="1114" kern="1200">
         <a:solidFill>
           <a:schemeClr val="tx1"/>
         </a:solidFill>
@@ -553,8 +553,8 @@
         <a:cs typeface="+mn-cs"/>
       </a:defRPr>
     </a:lvl7pPr>
-    <a:lvl8pPr marL="3200400" algn="l" defTabSz="457200" rtl="0" eaLnBrk="1" latinLnBrk="0" hangingPunct="1">
-      <a:defRPr sz="1200" kern="1200">
+    <a:lvl8pPr marL="2969525" algn="l" defTabSz="424219" rtl="0" eaLnBrk="1" latinLnBrk="0" hangingPunct="1">
+      <a:defRPr sz="1114" kern="1200">
         <a:solidFill>
           <a:schemeClr val="tx1"/>
         </a:solidFill>
@@ -563,8 +563,8 @@
         <a:cs typeface="+mn-cs"/>
       </a:defRPr>
     </a:lvl8pPr>
-    <a:lvl9pPr marL="3657600" algn="l" defTabSz="457200" rtl="0" eaLnBrk="1" latinLnBrk="0" hangingPunct="1">
-      <a:defRPr sz="1200" kern="1200">
+    <a:lvl9pPr marL="3393745" algn="l" defTabSz="424219" rtl="0" eaLnBrk="1" latinLnBrk="0" hangingPunct="1">
+      <a:defRPr sz="1114" kern="1200">
         <a:solidFill>
           <a:schemeClr val="tx1"/>
         </a:solidFill>
@@ -604,8 +604,8 @@
         </p:nvSpPr>
         <p:spPr bwMode="auto">
           <a:xfrm>
-            <a:off x="0" y="3886200"/>
-            <a:ext cx="43891200" cy="29489400"/>
+            <a:off x="0" y="3670300"/>
+            <a:ext cx="40233600" cy="27851100"/>
           </a:xfrm>
           <a:prstGeom prst="rect">
             <a:avLst/>
@@ -740,7 +740,7 @@
           </a:lstStyle>
           <a:p>
             <a:pPr algn="ctr" eaLnBrk="1" hangingPunct="1"/>
-            <a:endParaRPr lang="x-none" altLang="x-none">
+            <a:endParaRPr lang="x-none" altLang="x-none" sz="7885">
               <a:solidFill>
                 <a:srgbClr val="FFFFFF"/>
               </a:solidFill>
@@ -758,8 +758,8 @@
         </p:nvCxnSpPr>
         <p:spPr bwMode="auto">
           <a:xfrm>
-            <a:off x="0" y="4038600"/>
-            <a:ext cx="44881800" cy="0"/>
+            <a:off x="0" y="3814233"/>
+            <a:ext cx="41141650" cy="0"/>
           </a:xfrm>
           <a:prstGeom prst="line">
             <a:avLst/>
@@ -831,8 +831,8 @@
         </p:nvSpPr>
         <p:spPr>
           <a:xfrm>
-            <a:off x="2193925" y="1317625"/>
-            <a:ext cx="39503350" cy="5486400"/>
+            <a:off x="2011098" y="1244424"/>
+            <a:ext cx="36211404" cy="5181600"/>
           </a:xfrm>
           <a:prstGeom prst="rect">
             <a:avLst/>
@@ -862,8 +862,8 @@
         </p:nvSpPr>
         <p:spPr>
           <a:xfrm>
-            <a:off x="2193925" y="7680325"/>
-            <a:ext cx="39503350" cy="21724938"/>
+            <a:off x="2011098" y="7253640"/>
+            <a:ext cx="36211404" cy="20517997"/>
           </a:xfrm>
           <a:prstGeom prst="rect">
             <a:avLst/>
@@ -922,8 +922,8 @@
         </p:nvSpPr>
         <p:spPr>
           <a:xfrm>
-            <a:off x="2193925" y="30510163"/>
-            <a:ext cx="10242550" cy="1752600"/>
+            <a:off x="2011098" y="28815154"/>
+            <a:ext cx="9389004" cy="1655233"/>
           </a:xfrm>
           <a:prstGeom prst="rect">
             <a:avLst/>
@@ -962,8 +962,8 @@
         </p:nvSpPr>
         <p:spPr>
           <a:xfrm>
-            <a:off x="14995525" y="30510163"/>
-            <a:ext cx="13900150" cy="1752600"/>
+            <a:off x="13745898" y="28815154"/>
+            <a:ext cx="12741804" cy="1655233"/>
           </a:xfrm>
           <a:prstGeom prst="rect">
             <a:avLst/>
@@ -999,8 +999,8 @@
         </p:nvSpPr>
         <p:spPr>
           <a:xfrm>
-            <a:off x="31454725" y="30510163"/>
-            <a:ext cx="10242550" cy="1752600"/>
+            <a:off x="28833498" y="28815154"/>
+            <a:ext cx="9389004" cy="1655233"/>
           </a:xfrm>
           <a:prstGeom prst="rect">
             <a:avLst/>
@@ -1069,8 +1069,8 @@
         </p:nvSpPr>
         <p:spPr>
           <a:xfrm>
-            <a:off x="152742905" y="6324600"/>
-            <a:ext cx="47404018" cy="134820662"/>
+            <a:off x="140014332" y="5973233"/>
+            <a:ext cx="43453683" cy="127330625"/>
           </a:xfrm>
           <a:prstGeom prst="rect">
             <a:avLst/>
@@ -1100,8 +1100,8 @@
         </p:nvSpPr>
         <p:spPr>
           <a:xfrm>
-            <a:off x="10530843" y="6324600"/>
-            <a:ext cx="141480542" cy="134820662"/>
+            <a:off x="9653275" y="5973233"/>
+            <a:ext cx="129690497" cy="127330625"/>
           </a:xfrm>
           <a:prstGeom prst="rect">
             <a:avLst/>
@@ -1160,8 +1160,8 @@
         </p:nvSpPr>
         <p:spPr>
           <a:xfrm>
-            <a:off x="2193925" y="30510163"/>
-            <a:ext cx="10242550" cy="1752600"/>
+            <a:off x="2011098" y="28815154"/>
+            <a:ext cx="9389004" cy="1655233"/>
           </a:xfrm>
           <a:prstGeom prst="rect">
             <a:avLst/>
@@ -1200,8 +1200,8 @@
         </p:nvSpPr>
         <p:spPr>
           <a:xfrm>
-            <a:off x="14995525" y="30510163"/>
-            <a:ext cx="13900150" cy="1752600"/>
+            <a:off x="13745898" y="28815154"/>
+            <a:ext cx="12741804" cy="1655233"/>
           </a:xfrm>
           <a:prstGeom prst="rect">
             <a:avLst/>
@@ -1237,8 +1237,8 @@
         </p:nvSpPr>
         <p:spPr>
           <a:xfrm>
-            <a:off x="31454725" y="30510163"/>
-            <a:ext cx="10242550" cy="1752600"/>
+            <a:off x="28833498" y="28815154"/>
+            <a:ext cx="9389004" cy="1655233"/>
           </a:xfrm>
           <a:prstGeom prst="rect">
             <a:avLst/>
@@ -1305,8 +1305,8 @@
         </p:nvSpPr>
         <p:spPr bwMode="auto">
           <a:xfrm>
-            <a:off x="0" y="3886200"/>
-            <a:ext cx="43891200" cy="29489400"/>
+            <a:off x="0" y="3670300"/>
+            <a:ext cx="40233600" cy="27851100"/>
           </a:xfrm>
           <a:prstGeom prst="rect">
             <a:avLst/>
@@ -1441,7 +1441,7 @@
           </a:lstStyle>
           <a:p>
             <a:pPr algn="ctr" eaLnBrk="1" hangingPunct="1"/>
-            <a:endParaRPr lang="x-none" altLang="x-none">
+            <a:endParaRPr lang="x-none" altLang="x-none" sz="7885">
               <a:solidFill>
                 <a:srgbClr val="FFFFFF"/>
               </a:solidFill>
@@ -1459,8 +1459,8 @@
         </p:nvCxnSpPr>
         <p:spPr bwMode="auto">
           <a:xfrm>
-            <a:off x="0" y="4038600"/>
-            <a:ext cx="44881800" cy="0"/>
+            <a:off x="0" y="3814233"/>
+            <a:ext cx="41141650" cy="0"/>
           </a:xfrm>
           <a:prstGeom prst="line">
             <a:avLst/>
@@ -1532,8 +1532,8 @@
         </p:nvSpPr>
         <p:spPr>
           <a:xfrm>
-            <a:off x="3467102" y="21153122"/>
-            <a:ext cx="37307520" cy="6537960"/>
+            <a:off x="3178177" y="19977949"/>
+            <a:ext cx="34198560" cy="6174740"/>
           </a:xfrm>
           <a:prstGeom prst="rect">
             <a:avLst/>
@@ -1543,7 +1543,7 @@
           <a:bodyPr anchor="t"/>
           <a:lstStyle>
             <a:lvl1pPr algn="l">
-              <a:defRPr sz="19200" b="1" cap="all"/>
+              <a:defRPr sz="17602" b="1" cap="all"/>
             </a:lvl1pPr>
           </a:lstStyle>
           <a:p>
@@ -1567,8 +1567,8 @@
         </p:nvSpPr>
         <p:spPr>
           <a:xfrm>
-            <a:off x="3467102" y="13952225"/>
-            <a:ext cx="37307520" cy="7200898"/>
+            <a:off x="3178177" y="13177101"/>
+            <a:ext cx="34198560" cy="6800848"/>
           </a:xfrm>
           <a:prstGeom prst="rect">
             <a:avLst/>
@@ -1579,7 +1579,7 @@
           <a:lstStyle>
             <a:lvl1pPr marL="0" indent="0">
               <a:buNone/>
-              <a:defRPr sz="9600">
+              <a:defRPr sz="8800">
                 <a:solidFill>
                   <a:schemeClr val="tx1">
                     <a:tint val="75000"/>
@@ -1587,9 +1587,9 @@
                 </a:solidFill>
               </a:defRPr>
             </a:lvl1pPr>
-            <a:lvl2pPr marL="2194560" indent="0">
+            <a:lvl2pPr marL="2012147" indent="0">
               <a:buNone/>
-              <a:defRPr sz="8600">
+              <a:defRPr sz="7885">
                 <a:solidFill>
                   <a:schemeClr val="tx1">
                     <a:tint val="75000"/>
@@ -1597,9 +1597,9 @@
                 </a:solidFill>
               </a:defRPr>
             </a:lvl2pPr>
-            <a:lvl3pPr marL="4389120" indent="0">
+            <a:lvl3pPr marL="4024296" indent="0">
               <a:buNone/>
-              <a:defRPr sz="7700">
+              <a:defRPr sz="7060">
                 <a:solidFill>
                   <a:schemeClr val="tx1">
                     <a:tint val="75000"/>
@@ -1607,9 +1607,9 @@
                 </a:solidFill>
               </a:defRPr>
             </a:lvl3pPr>
-            <a:lvl4pPr marL="6583680" indent="0">
+            <a:lvl4pPr marL="6036442" indent="0">
               <a:buNone/>
-              <a:defRPr sz="6700">
+              <a:defRPr sz="6142">
                 <a:solidFill>
                   <a:schemeClr val="tx1">
                     <a:tint val="75000"/>
@@ -1617,9 +1617,9 @@
                 </a:solidFill>
               </a:defRPr>
             </a:lvl4pPr>
-            <a:lvl5pPr marL="8778240" indent="0">
+            <a:lvl5pPr marL="8048591" indent="0">
               <a:buNone/>
-              <a:defRPr sz="6700">
+              <a:defRPr sz="6142">
                 <a:solidFill>
                   <a:schemeClr val="tx1">
                     <a:tint val="75000"/>
@@ -1627,9 +1627,9 @@
                 </a:solidFill>
               </a:defRPr>
             </a:lvl5pPr>
-            <a:lvl6pPr marL="10972800" indent="0">
+            <a:lvl6pPr marL="10060740" indent="0">
               <a:buNone/>
-              <a:defRPr sz="6700">
+              <a:defRPr sz="6142">
                 <a:solidFill>
                   <a:schemeClr val="tx1">
                     <a:tint val="75000"/>
@@ -1637,9 +1637,9 @@
                 </a:solidFill>
               </a:defRPr>
             </a:lvl6pPr>
-            <a:lvl7pPr marL="13167360" indent="0">
+            <a:lvl7pPr marL="12072887" indent="0">
               <a:buNone/>
-              <a:defRPr sz="6700">
+              <a:defRPr sz="6142">
                 <a:solidFill>
                   <a:schemeClr val="tx1">
                     <a:tint val="75000"/>
@@ -1647,9 +1647,9 @@
                 </a:solidFill>
               </a:defRPr>
             </a:lvl7pPr>
-            <a:lvl8pPr marL="15361920" indent="0">
+            <a:lvl8pPr marL="14085036" indent="0">
               <a:buNone/>
-              <a:defRPr sz="6700">
+              <a:defRPr sz="6142">
                 <a:solidFill>
                   <a:schemeClr val="tx1">
                     <a:tint val="75000"/>
@@ -1657,9 +1657,9 @@
                 </a:solidFill>
               </a:defRPr>
             </a:lvl8pPr>
-            <a:lvl9pPr marL="17556480" indent="0">
+            <a:lvl9pPr marL="16097182" indent="0">
               <a:buNone/>
-              <a:defRPr sz="6700">
+              <a:defRPr sz="6142">
                 <a:solidFill>
                   <a:schemeClr val="tx1">
                     <a:tint val="75000"/>
@@ -1689,8 +1689,8 @@
         </p:nvSpPr>
         <p:spPr>
           <a:xfrm>
-            <a:off x="2193925" y="30510163"/>
-            <a:ext cx="10242550" cy="1752600"/>
+            <a:off x="2011098" y="28815154"/>
+            <a:ext cx="9389004" cy="1655233"/>
           </a:xfrm>
           <a:prstGeom prst="rect">
             <a:avLst/>
@@ -1729,8 +1729,8 @@
         </p:nvSpPr>
         <p:spPr>
           <a:xfrm>
-            <a:off x="14995525" y="30510163"/>
-            <a:ext cx="13900150" cy="1752600"/>
+            <a:off x="13745898" y="28815154"/>
+            <a:ext cx="12741804" cy="1655233"/>
           </a:xfrm>
           <a:prstGeom prst="rect">
             <a:avLst/>
@@ -1766,8 +1766,8 @@
         </p:nvSpPr>
         <p:spPr>
           <a:xfrm>
-            <a:off x="31454725" y="30510163"/>
-            <a:ext cx="10242550" cy="1752600"/>
+            <a:off x="28833498" y="28815154"/>
+            <a:ext cx="9389004" cy="1655233"/>
           </a:xfrm>
           <a:prstGeom prst="rect">
             <a:avLst/>
@@ -1836,8 +1836,8 @@
         </p:nvSpPr>
         <p:spPr>
           <a:xfrm>
-            <a:off x="2193925" y="1317625"/>
-            <a:ext cx="39503350" cy="5486400"/>
+            <a:off x="2011098" y="1244424"/>
+            <a:ext cx="36211404" cy="5181600"/>
           </a:xfrm>
           <a:prstGeom prst="rect">
             <a:avLst/>
@@ -1867,8 +1867,8 @@
         </p:nvSpPr>
         <p:spPr>
           <a:xfrm>
-            <a:off x="10530842" y="36865560"/>
-            <a:ext cx="94442280" cy="104279702"/>
+            <a:off x="9653272" y="34817473"/>
+            <a:ext cx="86572090" cy="98486385"/>
           </a:xfrm>
           <a:prstGeom prst="rect">
             <a:avLst/>
@@ -1878,31 +1878,31 @@
           <a:bodyPr/>
           <a:lstStyle>
             <a:lvl1pPr>
-              <a:defRPr sz="13400"/>
+              <a:defRPr sz="12287"/>
             </a:lvl1pPr>
             <a:lvl2pPr>
-              <a:defRPr sz="11500"/>
+              <a:defRPr sz="10542"/>
             </a:lvl2pPr>
             <a:lvl3pPr>
-              <a:defRPr sz="9600"/>
+              <a:defRPr sz="8800"/>
             </a:lvl3pPr>
             <a:lvl4pPr>
-              <a:defRPr sz="8600"/>
+              <a:defRPr sz="7885"/>
             </a:lvl4pPr>
             <a:lvl5pPr>
-              <a:defRPr sz="8600"/>
+              <a:defRPr sz="7885"/>
             </a:lvl5pPr>
             <a:lvl6pPr>
-              <a:defRPr sz="8600"/>
+              <a:defRPr sz="7885"/>
             </a:lvl6pPr>
             <a:lvl7pPr>
-              <a:defRPr sz="8600"/>
+              <a:defRPr sz="7885"/>
             </a:lvl7pPr>
             <a:lvl8pPr>
-              <a:defRPr sz="8600"/>
+              <a:defRPr sz="7885"/>
             </a:lvl8pPr>
             <a:lvl9pPr>
-              <a:defRPr sz="8600"/>
+              <a:defRPr sz="7885"/>
             </a:lvl9pPr>
           </a:lstStyle>
           <a:p>
@@ -1955,8 +1955,8 @@
         </p:nvSpPr>
         <p:spPr>
           <a:xfrm>
-            <a:off x="105704642" y="36865560"/>
-            <a:ext cx="94442280" cy="104279702"/>
+            <a:off x="96895922" y="34817473"/>
+            <a:ext cx="86572090" cy="98486385"/>
           </a:xfrm>
           <a:prstGeom prst="rect">
             <a:avLst/>
@@ -1966,31 +1966,31 @@
           <a:bodyPr/>
           <a:lstStyle>
             <a:lvl1pPr>
-              <a:defRPr sz="13400"/>
+              <a:defRPr sz="12287"/>
             </a:lvl1pPr>
             <a:lvl2pPr>
-              <a:defRPr sz="11500"/>
+              <a:defRPr sz="10542"/>
             </a:lvl2pPr>
             <a:lvl3pPr>
-              <a:defRPr sz="9600"/>
+              <a:defRPr sz="8800"/>
             </a:lvl3pPr>
             <a:lvl4pPr>
-              <a:defRPr sz="8600"/>
+              <a:defRPr sz="7885"/>
             </a:lvl4pPr>
             <a:lvl5pPr>
-              <a:defRPr sz="8600"/>
+              <a:defRPr sz="7885"/>
             </a:lvl5pPr>
             <a:lvl6pPr>
-              <a:defRPr sz="8600"/>
+              <a:defRPr sz="7885"/>
             </a:lvl6pPr>
             <a:lvl7pPr>
-              <a:defRPr sz="8600"/>
+              <a:defRPr sz="7885"/>
             </a:lvl7pPr>
             <a:lvl8pPr>
-              <a:defRPr sz="8600"/>
+              <a:defRPr sz="7885"/>
             </a:lvl8pPr>
             <a:lvl9pPr>
-              <a:defRPr sz="8600"/>
+              <a:defRPr sz="7885"/>
             </a:lvl9pPr>
           </a:lstStyle>
           <a:p>
@@ -2043,8 +2043,8 @@
         </p:nvSpPr>
         <p:spPr>
           <a:xfrm>
-            <a:off x="2193925" y="30510163"/>
-            <a:ext cx="10242550" cy="1752600"/>
+            <a:off x="2011098" y="28815154"/>
+            <a:ext cx="9389004" cy="1655233"/>
           </a:xfrm>
           <a:prstGeom prst="rect">
             <a:avLst/>
@@ -2083,8 +2083,8 @@
         </p:nvSpPr>
         <p:spPr>
           <a:xfrm>
-            <a:off x="14995525" y="30510163"/>
-            <a:ext cx="13900150" cy="1752600"/>
+            <a:off x="13745898" y="28815154"/>
+            <a:ext cx="12741804" cy="1655233"/>
           </a:xfrm>
           <a:prstGeom prst="rect">
             <a:avLst/>
@@ -2120,8 +2120,8 @@
         </p:nvSpPr>
         <p:spPr>
           <a:xfrm>
-            <a:off x="31454725" y="30510163"/>
-            <a:ext cx="10242550" cy="1752600"/>
+            <a:off x="28833498" y="28815154"/>
+            <a:ext cx="9389004" cy="1655233"/>
           </a:xfrm>
           <a:prstGeom prst="rect">
             <a:avLst/>
@@ -2190,8 +2190,8 @@
         </p:nvSpPr>
         <p:spPr>
           <a:xfrm>
-            <a:off x="2194560" y="1318262"/>
-            <a:ext cx="39502080" cy="5486400"/>
+            <a:off x="2011680" y="1245025"/>
+            <a:ext cx="36210240" cy="5181600"/>
           </a:xfrm>
           <a:prstGeom prst="rect">
             <a:avLst/>
@@ -2225,8 +2225,8 @@
         </p:nvSpPr>
         <p:spPr>
           <a:xfrm>
-            <a:off x="2194560" y="7368542"/>
-            <a:ext cx="19392902" cy="3070858"/>
+            <a:off x="2011685" y="6959178"/>
+            <a:ext cx="17776827" cy="2900255"/>
           </a:xfrm>
           <a:prstGeom prst="rect">
             <a:avLst/>
@@ -2237,39 +2237,39 @@
           <a:lstStyle>
             <a:lvl1pPr marL="0" indent="0">
               <a:buNone/>
-              <a:defRPr sz="11500" b="1"/>
+              <a:defRPr sz="10542" b="1"/>
             </a:lvl1pPr>
-            <a:lvl2pPr marL="2194560" indent="0">
+            <a:lvl2pPr marL="2012147" indent="0">
               <a:buNone/>
-              <a:defRPr sz="9600" b="1"/>
+              <a:defRPr sz="8800" b="1"/>
             </a:lvl2pPr>
-            <a:lvl3pPr marL="4389120" indent="0">
+            <a:lvl3pPr marL="4024296" indent="0">
               <a:buNone/>
-              <a:defRPr sz="8600" b="1"/>
+              <a:defRPr sz="7885" b="1"/>
             </a:lvl3pPr>
-            <a:lvl4pPr marL="6583680" indent="0">
+            <a:lvl4pPr marL="6036442" indent="0">
               <a:buNone/>
-              <a:defRPr sz="7700" b="1"/>
+              <a:defRPr sz="7060" b="1"/>
             </a:lvl4pPr>
-            <a:lvl5pPr marL="8778240" indent="0">
+            <a:lvl5pPr marL="8048591" indent="0">
               <a:buNone/>
-              <a:defRPr sz="7700" b="1"/>
+              <a:defRPr sz="7060" b="1"/>
             </a:lvl5pPr>
-            <a:lvl6pPr marL="10972800" indent="0">
+            <a:lvl6pPr marL="10060740" indent="0">
               <a:buNone/>
-              <a:defRPr sz="7700" b="1"/>
+              <a:defRPr sz="7060" b="1"/>
             </a:lvl6pPr>
-            <a:lvl7pPr marL="13167360" indent="0">
+            <a:lvl7pPr marL="12072887" indent="0">
               <a:buNone/>
-              <a:defRPr sz="7700" b="1"/>
+              <a:defRPr sz="7060" b="1"/>
             </a:lvl7pPr>
-            <a:lvl8pPr marL="15361920" indent="0">
+            <a:lvl8pPr marL="14085036" indent="0">
               <a:buNone/>
-              <a:defRPr sz="7700" b="1"/>
+              <a:defRPr sz="7060" b="1"/>
             </a:lvl8pPr>
-            <a:lvl9pPr marL="17556480" indent="0">
+            <a:lvl9pPr marL="16097182" indent="0">
               <a:buNone/>
-              <a:defRPr sz="7700" b="1"/>
+              <a:defRPr sz="7060" b="1"/>
             </a:lvl9pPr>
           </a:lstStyle>
           <a:p>
@@ -2293,8 +2293,8 @@
         </p:nvSpPr>
         <p:spPr>
           <a:xfrm>
-            <a:off x="2194560" y="10439400"/>
-            <a:ext cx="19392902" cy="18966182"/>
+            <a:off x="2011685" y="9859433"/>
+            <a:ext cx="17776827" cy="17912505"/>
           </a:xfrm>
           <a:prstGeom prst="rect">
             <a:avLst/>
@@ -2304,31 +2304,31 @@
           <a:bodyPr/>
           <a:lstStyle>
             <a:lvl1pPr>
-              <a:defRPr sz="11500"/>
+              <a:defRPr sz="10542"/>
             </a:lvl1pPr>
             <a:lvl2pPr>
-              <a:defRPr sz="9600"/>
+              <a:defRPr sz="8800"/>
             </a:lvl2pPr>
             <a:lvl3pPr>
-              <a:defRPr sz="8600"/>
+              <a:defRPr sz="7885"/>
             </a:lvl3pPr>
             <a:lvl4pPr>
-              <a:defRPr sz="7700"/>
+              <a:defRPr sz="7060"/>
             </a:lvl4pPr>
             <a:lvl5pPr>
-              <a:defRPr sz="7700"/>
+              <a:defRPr sz="7060"/>
             </a:lvl5pPr>
             <a:lvl6pPr>
-              <a:defRPr sz="7700"/>
+              <a:defRPr sz="7060"/>
             </a:lvl6pPr>
             <a:lvl7pPr>
-              <a:defRPr sz="7700"/>
+              <a:defRPr sz="7060"/>
             </a:lvl7pPr>
             <a:lvl8pPr>
-              <a:defRPr sz="7700"/>
+              <a:defRPr sz="7060"/>
             </a:lvl8pPr>
             <a:lvl9pPr>
-              <a:defRPr sz="7700"/>
+              <a:defRPr sz="7060"/>
             </a:lvl9pPr>
           </a:lstStyle>
           <a:p>
@@ -2381,8 +2381,8 @@
         </p:nvSpPr>
         <p:spPr>
           <a:xfrm>
-            <a:off x="22296122" y="7368542"/>
-            <a:ext cx="19400520" cy="3070858"/>
+            <a:off x="20438112" y="6959178"/>
+            <a:ext cx="17783810" cy="2900255"/>
           </a:xfrm>
           <a:prstGeom prst="rect">
             <a:avLst/>
@@ -2393,39 +2393,39 @@
           <a:lstStyle>
             <a:lvl1pPr marL="0" indent="0">
               <a:buNone/>
-              <a:defRPr sz="11500" b="1"/>
+              <a:defRPr sz="10542" b="1"/>
             </a:lvl1pPr>
-            <a:lvl2pPr marL="2194560" indent="0">
+            <a:lvl2pPr marL="2012147" indent="0">
               <a:buNone/>
-              <a:defRPr sz="9600" b="1"/>
+              <a:defRPr sz="8800" b="1"/>
             </a:lvl2pPr>
-            <a:lvl3pPr marL="4389120" indent="0">
+            <a:lvl3pPr marL="4024296" indent="0">
               <a:buNone/>
-              <a:defRPr sz="8600" b="1"/>
+              <a:defRPr sz="7885" b="1"/>
             </a:lvl3pPr>
-            <a:lvl4pPr marL="6583680" indent="0">
+            <a:lvl4pPr marL="6036442" indent="0">
               <a:buNone/>
-              <a:defRPr sz="7700" b="1"/>
+              <a:defRPr sz="7060" b="1"/>
             </a:lvl4pPr>
-            <a:lvl5pPr marL="8778240" indent="0">
+            <a:lvl5pPr marL="8048591" indent="0">
               <a:buNone/>
-              <a:defRPr sz="7700" b="1"/>
+              <a:defRPr sz="7060" b="1"/>
             </a:lvl5pPr>
-            <a:lvl6pPr marL="10972800" indent="0">
+            <a:lvl6pPr marL="10060740" indent="0">
               <a:buNone/>
-              <a:defRPr sz="7700" b="1"/>
+              <a:defRPr sz="7060" b="1"/>
             </a:lvl6pPr>
-            <a:lvl7pPr marL="13167360" indent="0">
+            <a:lvl7pPr marL="12072887" indent="0">
               <a:buNone/>
-              <a:defRPr sz="7700" b="1"/>
+              <a:defRPr sz="7060" b="1"/>
             </a:lvl7pPr>
-            <a:lvl8pPr marL="15361920" indent="0">
+            <a:lvl8pPr marL="14085036" indent="0">
               <a:buNone/>
-              <a:defRPr sz="7700" b="1"/>
+              <a:defRPr sz="7060" b="1"/>
             </a:lvl8pPr>
-            <a:lvl9pPr marL="17556480" indent="0">
+            <a:lvl9pPr marL="16097182" indent="0">
               <a:buNone/>
-              <a:defRPr sz="7700" b="1"/>
+              <a:defRPr sz="7060" b="1"/>
             </a:lvl9pPr>
           </a:lstStyle>
           <a:p>
@@ -2449,8 +2449,8 @@
         </p:nvSpPr>
         <p:spPr>
           <a:xfrm>
-            <a:off x="22296122" y="10439400"/>
-            <a:ext cx="19400520" cy="18966182"/>
+            <a:off x="20438112" y="9859433"/>
+            <a:ext cx="17783810" cy="17912505"/>
           </a:xfrm>
           <a:prstGeom prst="rect">
             <a:avLst/>
@@ -2460,31 +2460,31 @@
           <a:bodyPr/>
           <a:lstStyle>
             <a:lvl1pPr>
-              <a:defRPr sz="11500"/>
+              <a:defRPr sz="10542"/>
             </a:lvl1pPr>
             <a:lvl2pPr>
-              <a:defRPr sz="9600"/>
+              <a:defRPr sz="8800"/>
             </a:lvl2pPr>
             <a:lvl3pPr>
-              <a:defRPr sz="8600"/>
+              <a:defRPr sz="7885"/>
             </a:lvl3pPr>
             <a:lvl4pPr>
-              <a:defRPr sz="7700"/>
+              <a:defRPr sz="7060"/>
             </a:lvl4pPr>
             <a:lvl5pPr>
-              <a:defRPr sz="7700"/>
+              <a:defRPr sz="7060"/>
             </a:lvl5pPr>
             <a:lvl6pPr>
-              <a:defRPr sz="7700"/>
+              <a:defRPr sz="7060"/>
             </a:lvl6pPr>
             <a:lvl7pPr>
-              <a:defRPr sz="7700"/>
+              <a:defRPr sz="7060"/>
             </a:lvl7pPr>
             <a:lvl8pPr>
-              <a:defRPr sz="7700"/>
+              <a:defRPr sz="7060"/>
             </a:lvl8pPr>
             <a:lvl9pPr>
-              <a:defRPr sz="7700"/>
+              <a:defRPr sz="7060"/>
             </a:lvl9pPr>
           </a:lstStyle>
           <a:p>
@@ -2537,8 +2537,8 @@
         </p:nvSpPr>
         <p:spPr>
           <a:xfrm>
-            <a:off x="2193925" y="30510163"/>
-            <a:ext cx="10242550" cy="1752600"/>
+            <a:off x="2011098" y="28815154"/>
+            <a:ext cx="9389004" cy="1655233"/>
           </a:xfrm>
           <a:prstGeom prst="rect">
             <a:avLst/>
@@ -2577,8 +2577,8 @@
         </p:nvSpPr>
         <p:spPr>
           <a:xfrm>
-            <a:off x="14995525" y="30510163"/>
-            <a:ext cx="13900150" cy="1752600"/>
+            <a:off x="13745898" y="28815154"/>
+            <a:ext cx="12741804" cy="1655233"/>
           </a:xfrm>
           <a:prstGeom prst="rect">
             <a:avLst/>
@@ -2614,8 +2614,8 @@
         </p:nvSpPr>
         <p:spPr>
           <a:xfrm>
-            <a:off x="31454725" y="30510163"/>
-            <a:ext cx="10242550" cy="1752600"/>
+            <a:off x="28833498" y="28815154"/>
+            <a:ext cx="9389004" cy="1655233"/>
           </a:xfrm>
           <a:prstGeom prst="rect">
             <a:avLst/>
@@ -2684,8 +2684,8 @@
         </p:nvSpPr>
         <p:spPr>
           <a:xfrm>
-            <a:off x="2193925" y="1317625"/>
-            <a:ext cx="39503350" cy="5486400"/>
+            <a:off x="2011098" y="1244424"/>
+            <a:ext cx="36211404" cy="5181600"/>
           </a:xfrm>
           <a:prstGeom prst="rect">
             <a:avLst/>
@@ -2715,8 +2715,8 @@
         </p:nvSpPr>
         <p:spPr>
           <a:xfrm>
-            <a:off x="2193925" y="30510163"/>
-            <a:ext cx="10242550" cy="1752600"/>
+            <a:off x="2011098" y="28815154"/>
+            <a:ext cx="9389004" cy="1655233"/>
           </a:xfrm>
           <a:prstGeom prst="rect">
             <a:avLst/>
@@ -2755,8 +2755,8 @@
         </p:nvSpPr>
         <p:spPr>
           <a:xfrm>
-            <a:off x="14995525" y="30510163"/>
-            <a:ext cx="13900150" cy="1752600"/>
+            <a:off x="13745898" y="28815154"/>
+            <a:ext cx="12741804" cy="1655233"/>
           </a:xfrm>
           <a:prstGeom prst="rect">
             <a:avLst/>
@@ -2792,8 +2792,8 @@
         </p:nvSpPr>
         <p:spPr>
           <a:xfrm>
-            <a:off x="31454725" y="30510163"/>
-            <a:ext cx="10242550" cy="1752600"/>
+            <a:off x="28833498" y="28815154"/>
+            <a:ext cx="9389004" cy="1655233"/>
           </a:xfrm>
           <a:prstGeom prst="rect">
             <a:avLst/>
@@ -2862,8 +2862,8 @@
         </p:nvSpPr>
         <p:spPr>
           <a:xfrm>
-            <a:off x="2193925" y="30510163"/>
-            <a:ext cx="10242550" cy="1752600"/>
+            <a:off x="2011098" y="28815154"/>
+            <a:ext cx="9389004" cy="1655233"/>
           </a:xfrm>
           <a:prstGeom prst="rect">
             <a:avLst/>
@@ -2902,8 +2902,8 @@
         </p:nvSpPr>
         <p:spPr>
           <a:xfrm>
-            <a:off x="14995525" y="30510163"/>
-            <a:ext cx="13900150" cy="1752600"/>
+            <a:off x="13745898" y="28815154"/>
+            <a:ext cx="12741804" cy="1655233"/>
           </a:xfrm>
           <a:prstGeom prst="rect">
             <a:avLst/>
@@ -2939,8 +2939,8 @@
         </p:nvSpPr>
         <p:spPr>
           <a:xfrm>
-            <a:off x="31454725" y="30510163"/>
-            <a:ext cx="10242550" cy="1752600"/>
+            <a:off x="28833498" y="28815154"/>
+            <a:ext cx="9389004" cy="1655233"/>
           </a:xfrm>
           <a:prstGeom prst="rect">
             <a:avLst/>
@@ -3009,8 +3009,8 @@
         </p:nvSpPr>
         <p:spPr>
           <a:xfrm>
-            <a:off x="2194563" y="1310640"/>
-            <a:ext cx="14439902" cy="5577840"/>
+            <a:off x="2011685" y="1237827"/>
+            <a:ext cx="13236577" cy="5267960"/>
           </a:xfrm>
           <a:prstGeom prst="rect">
             <a:avLst/>
@@ -3020,7 +3020,7 @@
           <a:bodyPr anchor="b"/>
           <a:lstStyle>
             <a:lvl1pPr algn="l">
-              <a:defRPr sz="9600" b="1"/>
+              <a:defRPr sz="8800" b="1"/>
             </a:lvl1pPr>
           </a:lstStyle>
           <a:p>
@@ -3044,8 +3044,8 @@
         </p:nvSpPr>
         <p:spPr>
           <a:xfrm>
-            <a:off x="17160240" y="1310643"/>
-            <a:ext cx="24536400" cy="28094942"/>
+            <a:off x="15730220" y="1237829"/>
+            <a:ext cx="22491700" cy="26534112"/>
           </a:xfrm>
           <a:prstGeom prst="rect">
             <a:avLst/>
@@ -3055,31 +3055,31 @@
           <a:bodyPr/>
           <a:lstStyle>
             <a:lvl1pPr>
-              <a:defRPr sz="15400"/>
+              <a:defRPr sz="14117"/>
             </a:lvl1pPr>
             <a:lvl2pPr>
-              <a:defRPr sz="13400"/>
+              <a:defRPr sz="12287"/>
             </a:lvl2pPr>
             <a:lvl3pPr>
-              <a:defRPr sz="11500"/>
+              <a:defRPr sz="10542"/>
             </a:lvl3pPr>
             <a:lvl4pPr>
-              <a:defRPr sz="9600"/>
+              <a:defRPr sz="8800"/>
             </a:lvl4pPr>
             <a:lvl5pPr>
-              <a:defRPr sz="9600"/>
+              <a:defRPr sz="8800"/>
             </a:lvl5pPr>
             <a:lvl6pPr>
-              <a:defRPr sz="9600"/>
+              <a:defRPr sz="8800"/>
             </a:lvl6pPr>
             <a:lvl7pPr>
-              <a:defRPr sz="9600"/>
+              <a:defRPr sz="8800"/>
             </a:lvl7pPr>
             <a:lvl8pPr>
-              <a:defRPr sz="9600"/>
+              <a:defRPr sz="8800"/>
             </a:lvl8pPr>
             <a:lvl9pPr>
-              <a:defRPr sz="9600"/>
+              <a:defRPr sz="8800"/>
             </a:lvl9pPr>
           </a:lstStyle>
           <a:p>
@@ -3132,8 +3132,8 @@
         </p:nvSpPr>
         <p:spPr>
           <a:xfrm>
-            <a:off x="2194563" y="6888483"/>
-            <a:ext cx="14439902" cy="22517102"/>
+            <a:off x="2011685" y="6505789"/>
+            <a:ext cx="13236577" cy="21266152"/>
           </a:xfrm>
           <a:prstGeom prst="rect">
             <a:avLst/>
@@ -3144,39 +3144,39 @@
           <a:lstStyle>
             <a:lvl1pPr marL="0" indent="0">
               <a:buNone/>
-              <a:defRPr sz="6700"/>
+              <a:defRPr sz="6142"/>
             </a:lvl1pPr>
-            <a:lvl2pPr marL="2194560" indent="0">
+            <a:lvl2pPr marL="2012147" indent="0">
               <a:buNone/>
-              <a:defRPr sz="5800"/>
+              <a:defRPr sz="5317"/>
             </a:lvl2pPr>
-            <a:lvl3pPr marL="4389120" indent="0">
+            <a:lvl3pPr marL="4024296" indent="0">
               <a:buNone/>
-              <a:defRPr sz="4800"/>
+              <a:defRPr sz="4400"/>
             </a:lvl3pPr>
-            <a:lvl4pPr marL="6583680" indent="0">
+            <a:lvl4pPr marL="6036442" indent="0">
               <a:buNone/>
-              <a:defRPr sz="4300"/>
+              <a:defRPr sz="3942"/>
             </a:lvl4pPr>
-            <a:lvl5pPr marL="8778240" indent="0">
+            <a:lvl5pPr marL="8048591" indent="0">
               <a:buNone/>
-              <a:defRPr sz="4300"/>
+              <a:defRPr sz="3942"/>
             </a:lvl5pPr>
-            <a:lvl6pPr marL="10972800" indent="0">
+            <a:lvl6pPr marL="10060740" indent="0">
               <a:buNone/>
-              <a:defRPr sz="4300"/>
+              <a:defRPr sz="3942"/>
             </a:lvl6pPr>
-            <a:lvl7pPr marL="13167360" indent="0">
+            <a:lvl7pPr marL="12072887" indent="0">
               <a:buNone/>
-              <a:defRPr sz="4300"/>
+              <a:defRPr sz="3942"/>
             </a:lvl7pPr>
-            <a:lvl8pPr marL="15361920" indent="0">
+            <a:lvl8pPr marL="14085036" indent="0">
               <a:buNone/>
-              <a:defRPr sz="4300"/>
+              <a:defRPr sz="3942"/>
             </a:lvl8pPr>
-            <a:lvl9pPr marL="17556480" indent="0">
+            <a:lvl9pPr marL="16097182" indent="0">
               <a:buNone/>
-              <a:defRPr sz="4300"/>
+              <a:defRPr sz="3942"/>
             </a:lvl9pPr>
           </a:lstStyle>
           <a:p>
@@ -3200,8 +3200,8 @@
         </p:nvSpPr>
         <p:spPr>
           <a:xfrm>
-            <a:off x="2193925" y="30510163"/>
-            <a:ext cx="10242550" cy="1752600"/>
+            <a:off x="2011098" y="28815154"/>
+            <a:ext cx="9389004" cy="1655233"/>
           </a:xfrm>
           <a:prstGeom prst="rect">
             <a:avLst/>
@@ -3240,8 +3240,8 @@
         </p:nvSpPr>
         <p:spPr>
           <a:xfrm>
-            <a:off x="14995525" y="30510163"/>
-            <a:ext cx="13900150" cy="1752600"/>
+            <a:off x="13745898" y="28815154"/>
+            <a:ext cx="12741804" cy="1655233"/>
           </a:xfrm>
           <a:prstGeom prst="rect">
             <a:avLst/>
@@ -3277,8 +3277,8 @@
         </p:nvSpPr>
         <p:spPr>
           <a:xfrm>
-            <a:off x="31454725" y="30510163"/>
-            <a:ext cx="10242550" cy="1752600"/>
+            <a:off x="28833498" y="28815154"/>
+            <a:ext cx="9389004" cy="1655233"/>
           </a:xfrm>
           <a:prstGeom prst="rect">
             <a:avLst/>
@@ -3347,8 +3347,8 @@
         </p:nvSpPr>
         <p:spPr>
           <a:xfrm>
-            <a:off x="8602982" y="23042880"/>
-            <a:ext cx="26334720" cy="2720342"/>
+            <a:off x="7886067" y="21762720"/>
+            <a:ext cx="24140160" cy="2569212"/>
           </a:xfrm>
           <a:prstGeom prst="rect">
             <a:avLst/>
@@ -3358,7 +3358,7 @@
           <a:bodyPr anchor="b"/>
           <a:lstStyle>
             <a:lvl1pPr algn="l">
-              <a:defRPr sz="9600" b="1"/>
+              <a:defRPr sz="8800" b="1"/>
             </a:lvl1pPr>
           </a:lstStyle>
           <a:p>
@@ -3382,8 +3382,8 @@
         </p:nvSpPr>
         <p:spPr>
           <a:xfrm>
-            <a:off x="8602982" y="2941320"/>
-            <a:ext cx="26334720" cy="19751040"/>
+            <a:off x="7886067" y="2777913"/>
+            <a:ext cx="24140160" cy="18653760"/>
           </a:xfrm>
           <a:prstGeom prst="rect">
             <a:avLst/>
@@ -3396,39 +3396,39 @@
           <a:lstStyle>
             <a:lvl1pPr marL="0" indent="0">
               <a:buNone/>
-              <a:defRPr sz="15400"/>
+              <a:defRPr sz="14117"/>
             </a:lvl1pPr>
-            <a:lvl2pPr marL="2194560" indent="0">
+            <a:lvl2pPr marL="2012147" indent="0">
               <a:buNone/>
-              <a:defRPr sz="13400"/>
+              <a:defRPr sz="12287"/>
             </a:lvl2pPr>
-            <a:lvl3pPr marL="4389120" indent="0">
+            <a:lvl3pPr marL="4024296" indent="0">
               <a:buNone/>
-              <a:defRPr sz="11500"/>
+              <a:defRPr sz="10542"/>
             </a:lvl3pPr>
-            <a:lvl4pPr marL="6583680" indent="0">
+            <a:lvl4pPr marL="6036442" indent="0">
               <a:buNone/>
-              <a:defRPr sz="9600"/>
+              <a:defRPr sz="8800"/>
             </a:lvl4pPr>
-            <a:lvl5pPr marL="8778240" indent="0">
+            <a:lvl5pPr marL="8048591" indent="0">
               <a:buNone/>
-              <a:defRPr sz="9600"/>
+              <a:defRPr sz="8800"/>
             </a:lvl5pPr>
-            <a:lvl6pPr marL="10972800" indent="0">
+            <a:lvl6pPr marL="10060740" indent="0">
               <a:buNone/>
-              <a:defRPr sz="9600"/>
+              <a:defRPr sz="8800"/>
             </a:lvl6pPr>
-            <a:lvl7pPr marL="13167360" indent="0">
+            <a:lvl7pPr marL="12072887" indent="0">
               <a:buNone/>
-              <a:defRPr sz="9600"/>
+              <a:defRPr sz="8800"/>
             </a:lvl7pPr>
-            <a:lvl8pPr marL="15361920" indent="0">
+            <a:lvl8pPr marL="14085036" indent="0">
               <a:buNone/>
-              <a:defRPr sz="9600"/>
+              <a:defRPr sz="8800"/>
             </a:lvl8pPr>
-            <a:lvl9pPr marL="17556480" indent="0">
+            <a:lvl9pPr marL="16097182" indent="0">
               <a:buNone/>
-              <a:defRPr sz="9600"/>
+              <a:defRPr sz="8800"/>
             </a:lvl9pPr>
           </a:lstStyle>
           <a:p>
@@ -3449,8 +3449,8 @@
         </p:nvSpPr>
         <p:spPr>
           <a:xfrm>
-            <a:off x="8602982" y="25763222"/>
-            <a:ext cx="26334720" cy="3863338"/>
+            <a:off x="7886067" y="24331932"/>
+            <a:ext cx="24140160" cy="3648708"/>
           </a:xfrm>
           <a:prstGeom prst="rect">
             <a:avLst/>
@@ -3461,39 +3461,39 @@
           <a:lstStyle>
             <a:lvl1pPr marL="0" indent="0">
               <a:buNone/>
-              <a:defRPr sz="6700"/>
+              <a:defRPr sz="6142"/>
             </a:lvl1pPr>
-            <a:lvl2pPr marL="2194560" indent="0">
+            <a:lvl2pPr marL="2012147" indent="0">
               <a:buNone/>
-              <a:defRPr sz="5800"/>
+              <a:defRPr sz="5317"/>
             </a:lvl2pPr>
-            <a:lvl3pPr marL="4389120" indent="0">
+            <a:lvl3pPr marL="4024296" indent="0">
               <a:buNone/>
-              <a:defRPr sz="4800"/>
+              <a:defRPr sz="4400"/>
             </a:lvl3pPr>
-            <a:lvl4pPr marL="6583680" indent="0">
+            <a:lvl4pPr marL="6036442" indent="0">
               <a:buNone/>
-              <a:defRPr sz="4300"/>
+              <a:defRPr sz="3942"/>
             </a:lvl4pPr>
-            <a:lvl5pPr marL="8778240" indent="0">
+            <a:lvl5pPr marL="8048591" indent="0">
               <a:buNone/>
-              <a:defRPr sz="4300"/>
+              <a:defRPr sz="3942"/>
             </a:lvl5pPr>
-            <a:lvl6pPr marL="10972800" indent="0">
+            <a:lvl6pPr marL="10060740" indent="0">
               <a:buNone/>
-              <a:defRPr sz="4300"/>
+              <a:defRPr sz="3942"/>
             </a:lvl6pPr>
-            <a:lvl7pPr marL="13167360" indent="0">
+            <a:lvl7pPr marL="12072887" indent="0">
               <a:buNone/>
-              <a:defRPr sz="4300"/>
+              <a:defRPr sz="3942"/>
             </a:lvl7pPr>
-            <a:lvl8pPr marL="15361920" indent="0">
+            <a:lvl8pPr marL="14085036" indent="0">
               <a:buNone/>
-              <a:defRPr sz="4300"/>
+              <a:defRPr sz="3942"/>
             </a:lvl8pPr>
-            <a:lvl9pPr marL="17556480" indent="0">
+            <a:lvl9pPr marL="16097182" indent="0">
               <a:buNone/>
-              <a:defRPr sz="4300"/>
+              <a:defRPr sz="3942"/>
             </a:lvl9pPr>
           </a:lstStyle>
           <a:p>
@@ -3517,8 +3517,8 @@
         </p:nvSpPr>
         <p:spPr>
           <a:xfrm>
-            <a:off x="2193925" y="30510163"/>
-            <a:ext cx="10242550" cy="1752600"/>
+            <a:off x="2011098" y="28815154"/>
+            <a:ext cx="9389004" cy="1655233"/>
           </a:xfrm>
           <a:prstGeom prst="rect">
             <a:avLst/>
@@ -3557,8 +3557,8 @@
         </p:nvSpPr>
         <p:spPr>
           <a:xfrm>
-            <a:off x="14995525" y="30510163"/>
-            <a:ext cx="13900150" cy="1752600"/>
+            <a:off x="13745898" y="28815154"/>
+            <a:ext cx="12741804" cy="1655233"/>
           </a:xfrm>
           <a:prstGeom prst="rect">
             <a:avLst/>
@@ -3594,8 +3594,8 @@
         </p:nvSpPr>
         <p:spPr>
           <a:xfrm>
-            <a:off x="31454725" y="30510163"/>
-            <a:ext cx="10242550" cy="1752600"/>
+            <a:off x="28833498" y="28815154"/>
+            <a:ext cx="9389004" cy="1655233"/>
           </a:xfrm>
           <a:prstGeom prst="rect">
             <a:avLst/>
@@ -3675,14 +3675,14 @@
   </p:sldLayoutIdLst>
   <p:txStyles>
     <p:titleStyle>
-      <a:lvl1pPr algn="ctr" defTabSz="2193925" rtl="0" eaLnBrk="0" fontAlgn="base" hangingPunct="0">
+      <a:lvl1pPr algn="ctr" defTabSz="2011565" rtl="0" eaLnBrk="0" fontAlgn="base" hangingPunct="0">
         <a:spcBef>
           <a:spcPct val="0"/>
         </a:spcBef>
         <a:spcAft>
           <a:spcPct val="0"/>
         </a:spcAft>
-        <a:defRPr sz="21100" kern="1200">
+        <a:defRPr sz="19342" kern="1200">
           <a:solidFill>
             <a:schemeClr val="tx1"/>
           </a:solidFill>
@@ -3691,14 +3691,14 @@
           <a:cs typeface="ＭＳ Ｐゴシック" pitchFamily="-108" charset="-128"/>
         </a:defRPr>
       </a:lvl1pPr>
-      <a:lvl2pPr algn="ctr" defTabSz="2193925" rtl="0" eaLnBrk="0" fontAlgn="base" hangingPunct="0">
+      <a:lvl2pPr algn="ctr" defTabSz="2011565" rtl="0" eaLnBrk="0" fontAlgn="base" hangingPunct="0">
         <a:spcBef>
           <a:spcPct val="0"/>
         </a:spcBef>
         <a:spcAft>
           <a:spcPct val="0"/>
         </a:spcAft>
-        <a:defRPr sz="21100">
+        <a:defRPr sz="19342">
           <a:solidFill>
             <a:schemeClr val="tx1"/>
           </a:solidFill>
@@ -3707,14 +3707,14 @@
           <a:cs typeface="ＭＳ Ｐゴシック" pitchFamily="-108" charset="-128"/>
         </a:defRPr>
       </a:lvl2pPr>
-      <a:lvl3pPr algn="ctr" defTabSz="2193925" rtl="0" eaLnBrk="0" fontAlgn="base" hangingPunct="0">
+      <a:lvl3pPr algn="ctr" defTabSz="2011565" rtl="0" eaLnBrk="0" fontAlgn="base" hangingPunct="0">
         <a:spcBef>
           <a:spcPct val="0"/>
         </a:spcBef>
         <a:spcAft>
           <a:spcPct val="0"/>
         </a:spcAft>
-        <a:defRPr sz="21100">
+        <a:defRPr sz="19342">
           <a:solidFill>
             <a:schemeClr val="tx1"/>
           </a:solidFill>
@@ -3723,14 +3723,14 @@
           <a:cs typeface="ＭＳ Ｐゴシック" pitchFamily="-108" charset="-128"/>
         </a:defRPr>
       </a:lvl3pPr>
-      <a:lvl4pPr algn="ctr" defTabSz="2193925" rtl="0" eaLnBrk="0" fontAlgn="base" hangingPunct="0">
+      <a:lvl4pPr algn="ctr" defTabSz="2011565" rtl="0" eaLnBrk="0" fontAlgn="base" hangingPunct="0">
         <a:spcBef>
           <a:spcPct val="0"/>
         </a:spcBef>
         <a:spcAft>
           <a:spcPct val="0"/>
         </a:spcAft>
-        <a:defRPr sz="21100">
+        <a:defRPr sz="19342">
           <a:solidFill>
             <a:schemeClr val="tx1"/>
           </a:solidFill>
@@ -3739,14 +3739,14 @@
           <a:cs typeface="ＭＳ Ｐゴシック" pitchFamily="-108" charset="-128"/>
         </a:defRPr>
       </a:lvl4pPr>
-      <a:lvl5pPr algn="ctr" defTabSz="2193925" rtl="0" eaLnBrk="0" fontAlgn="base" hangingPunct="0">
+      <a:lvl5pPr algn="ctr" defTabSz="2011565" rtl="0" eaLnBrk="0" fontAlgn="base" hangingPunct="0">
         <a:spcBef>
           <a:spcPct val="0"/>
         </a:spcBef>
         <a:spcAft>
           <a:spcPct val="0"/>
         </a:spcAft>
-        <a:defRPr sz="21100">
+        <a:defRPr sz="19342">
           <a:solidFill>
             <a:schemeClr val="tx1"/>
           </a:solidFill>
@@ -3755,14 +3755,14 @@
           <a:cs typeface="ＭＳ Ｐゴシック" pitchFamily="-108" charset="-128"/>
         </a:defRPr>
       </a:lvl5pPr>
-      <a:lvl6pPr marL="457200" algn="ctr" defTabSz="2193925" rtl="0" fontAlgn="base">
+      <a:lvl6pPr marL="419199" algn="ctr" defTabSz="2011565" rtl="0" fontAlgn="base">
         <a:spcBef>
           <a:spcPct val="0"/>
         </a:spcBef>
         <a:spcAft>
           <a:spcPct val="0"/>
         </a:spcAft>
-        <a:defRPr sz="21100">
+        <a:defRPr sz="19342">
           <a:solidFill>
             <a:schemeClr val="tx1"/>
           </a:solidFill>
@@ -3771,14 +3771,14 @@
           <a:cs typeface="ＭＳ Ｐゴシック" pitchFamily="-108" charset="-128"/>
         </a:defRPr>
       </a:lvl6pPr>
-      <a:lvl7pPr marL="914400" algn="ctr" defTabSz="2193925" rtl="0" fontAlgn="base">
+      <a:lvl7pPr marL="838393" algn="ctr" defTabSz="2011565" rtl="0" fontAlgn="base">
         <a:spcBef>
           <a:spcPct val="0"/>
         </a:spcBef>
         <a:spcAft>
           <a:spcPct val="0"/>
         </a:spcAft>
-        <a:defRPr sz="21100">
+        <a:defRPr sz="19342">
           <a:solidFill>
             <a:schemeClr val="tx1"/>
           </a:solidFill>
@@ -3787,14 +3787,14 @@
           <a:cs typeface="ＭＳ Ｐゴシック" pitchFamily="-108" charset="-128"/>
         </a:defRPr>
       </a:lvl7pPr>
-      <a:lvl8pPr marL="1371600" algn="ctr" defTabSz="2193925" rtl="0" fontAlgn="base">
+      <a:lvl8pPr marL="1257592" algn="ctr" defTabSz="2011565" rtl="0" fontAlgn="base">
         <a:spcBef>
           <a:spcPct val="0"/>
         </a:spcBef>
         <a:spcAft>
           <a:spcPct val="0"/>
         </a:spcAft>
-        <a:defRPr sz="21100">
+        <a:defRPr sz="19342">
           <a:solidFill>
             <a:schemeClr val="tx1"/>
           </a:solidFill>
@@ -3803,14 +3803,14 @@
           <a:cs typeface="ＭＳ Ｐゴシック" pitchFamily="-108" charset="-128"/>
         </a:defRPr>
       </a:lvl8pPr>
-      <a:lvl9pPr marL="1828800" algn="ctr" defTabSz="2193925" rtl="0" fontAlgn="base">
+      <a:lvl9pPr marL="1676790" algn="ctr" defTabSz="2011565" rtl="0" fontAlgn="base">
         <a:spcBef>
           <a:spcPct val="0"/>
         </a:spcBef>
         <a:spcAft>
           <a:spcPct val="0"/>
         </a:spcAft>
-        <a:defRPr sz="21100">
+        <a:defRPr sz="19342">
           <a:solidFill>
             <a:schemeClr val="tx1"/>
           </a:solidFill>
@@ -3821,7 +3821,7 @@
       </a:lvl9pPr>
     </p:titleStyle>
     <p:bodyStyle>
-      <a:lvl1pPr marL="1644650" indent="-1644650" algn="l" defTabSz="2193925" rtl="0" eaLnBrk="0" fontAlgn="base" hangingPunct="0">
+      <a:lvl1pPr marL="1507946" indent="-1507946" algn="l" defTabSz="2011565" rtl="0" eaLnBrk="0" fontAlgn="base" hangingPunct="0">
         <a:spcBef>
           <a:spcPct val="20000"/>
         </a:spcBef>
@@ -3830,7 +3830,7 @@
         </a:spcAft>
         <a:buFont typeface="Arial" charset="0"/>
         <a:buChar char="•"/>
-        <a:defRPr sz="15400" kern="1200">
+        <a:defRPr sz="14117" kern="1200">
           <a:solidFill>
             <a:schemeClr val="tx1"/>
           </a:solidFill>
@@ -3839,7 +3839,7 @@
           <a:cs typeface="ＭＳ Ｐゴシック" pitchFamily="-108" charset="-128"/>
         </a:defRPr>
       </a:lvl1pPr>
-      <a:lvl2pPr marL="3565525" indent="-1371600" algn="l" defTabSz="2193925" rtl="0" eaLnBrk="0" fontAlgn="base" hangingPunct="0">
+      <a:lvl2pPr marL="3269158" indent="-1257592" algn="l" defTabSz="2011565" rtl="0" eaLnBrk="0" fontAlgn="base" hangingPunct="0">
         <a:spcBef>
           <a:spcPct val="20000"/>
         </a:spcBef>
@@ -3848,7 +3848,7 @@
         </a:spcAft>
         <a:buFont typeface="Arial" charset="0"/>
         <a:buChar char="–"/>
-        <a:defRPr sz="13400" kern="1200">
+        <a:defRPr sz="12287" kern="1200">
           <a:solidFill>
             <a:schemeClr val="tx1"/>
           </a:solidFill>
@@ -3857,7 +3857,7 @@
           <a:cs typeface="+mn-cs"/>
         </a:defRPr>
       </a:lvl2pPr>
-      <a:lvl3pPr marL="5486400" indent="-1096963" algn="l" defTabSz="2193925" rtl="0" eaLnBrk="0" fontAlgn="base" hangingPunct="0">
+      <a:lvl3pPr marL="5030370" indent="-1005782" algn="l" defTabSz="2011565" rtl="0" eaLnBrk="0" fontAlgn="base" hangingPunct="0">
         <a:spcBef>
           <a:spcPct val="20000"/>
         </a:spcBef>
@@ -3866,7 +3866,7 @@
         </a:spcAft>
         <a:buFont typeface="Arial" charset="0"/>
         <a:buChar char="•"/>
-        <a:defRPr sz="11500" kern="1200">
+        <a:defRPr sz="10542" kern="1200">
           <a:solidFill>
             <a:schemeClr val="tx1"/>
           </a:solidFill>
@@ -3875,7 +3875,7 @@
           <a:cs typeface="+mn-cs"/>
         </a:defRPr>
       </a:lvl3pPr>
-      <a:lvl4pPr marL="7680325" indent="-1096963" algn="l" defTabSz="2193925" rtl="0" eaLnBrk="0" fontAlgn="base" hangingPunct="0">
+      <a:lvl4pPr marL="7041934" indent="-1005782" algn="l" defTabSz="2011565" rtl="0" eaLnBrk="0" fontAlgn="base" hangingPunct="0">
         <a:spcBef>
           <a:spcPct val="20000"/>
         </a:spcBef>
@@ -3884,7 +3884,7 @@
         </a:spcAft>
         <a:buFont typeface="Arial" charset="0"/>
         <a:buChar char="–"/>
-        <a:defRPr sz="9600" kern="1200">
+        <a:defRPr sz="8800" kern="1200">
           <a:solidFill>
             <a:schemeClr val="tx1"/>
           </a:solidFill>
@@ -3893,7 +3893,7 @@
           <a:cs typeface="+mn-cs"/>
         </a:defRPr>
       </a:lvl4pPr>
-      <a:lvl5pPr marL="9874250" indent="-1096963" algn="l" defTabSz="2193925" rtl="0" eaLnBrk="0" fontAlgn="base" hangingPunct="0">
+      <a:lvl5pPr marL="9053502" indent="-1005782" algn="l" defTabSz="2011565" rtl="0" eaLnBrk="0" fontAlgn="base" hangingPunct="0">
         <a:spcBef>
           <a:spcPct val="20000"/>
         </a:spcBef>
@@ -3902,7 +3902,7 @@
         </a:spcAft>
         <a:buFont typeface="Arial" charset="0"/>
         <a:buChar char="»"/>
-        <a:defRPr sz="9600" kern="1200">
+        <a:defRPr sz="8800" kern="1200">
           <a:solidFill>
             <a:schemeClr val="tx1"/>
           </a:solidFill>
@@ -3911,13 +3911,13 @@
           <a:cs typeface="+mn-cs"/>
         </a:defRPr>
       </a:lvl5pPr>
-      <a:lvl6pPr marL="12070080" indent="-1097280" algn="l" defTabSz="2194560" rtl="0" eaLnBrk="1" latinLnBrk="0" hangingPunct="1">
+      <a:lvl6pPr marL="11066812" indent="-1006073" algn="l" defTabSz="2012147" rtl="0" eaLnBrk="1" latinLnBrk="0" hangingPunct="1">
         <a:spcBef>
           <a:spcPct val="20000"/>
         </a:spcBef>
         <a:buFont typeface="Arial"/>
         <a:buChar char="•"/>
-        <a:defRPr sz="9600" kern="1200">
+        <a:defRPr sz="8800" kern="1200">
           <a:solidFill>
             <a:schemeClr val="tx1"/>
           </a:solidFill>
@@ -3926,13 +3926,13 @@
           <a:cs typeface="+mn-cs"/>
         </a:defRPr>
       </a:lvl6pPr>
-      <a:lvl7pPr marL="14264640" indent="-1097280" algn="l" defTabSz="2194560" rtl="0" eaLnBrk="1" latinLnBrk="0" hangingPunct="1">
+      <a:lvl7pPr marL="13078961" indent="-1006073" algn="l" defTabSz="2012147" rtl="0" eaLnBrk="1" latinLnBrk="0" hangingPunct="1">
         <a:spcBef>
           <a:spcPct val="20000"/>
         </a:spcBef>
         <a:buFont typeface="Arial"/>
         <a:buChar char="•"/>
-        <a:defRPr sz="9600" kern="1200">
+        <a:defRPr sz="8800" kern="1200">
           <a:solidFill>
             <a:schemeClr val="tx1"/>
           </a:solidFill>
@@ -3941,13 +3941,13 @@
           <a:cs typeface="+mn-cs"/>
         </a:defRPr>
       </a:lvl7pPr>
-      <a:lvl8pPr marL="16459200" indent="-1097280" algn="l" defTabSz="2194560" rtl="0" eaLnBrk="1" latinLnBrk="0" hangingPunct="1">
+      <a:lvl8pPr marL="15091110" indent="-1006073" algn="l" defTabSz="2012147" rtl="0" eaLnBrk="1" latinLnBrk="0" hangingPunct="1">
         <a:spcBef>
           <a:spcPct val="20000"/>
         </a:spcBef>
         <a:buFont typeface="Arial"/>
         <a:buChar char="•"/>
-        <a:defRPr sz="9600" kern="1200">
+        <a:defRPr sz="8800" kern="1200">
           <a:solidFill>
             <a:schemeClr val="tx1"/>
           </a:solidFill>
@@ -3956,13 +3956,13 @@
           <a:cs typeface="+mn-cs"/>
         </a:defRPr>
       </a:lvl8pPr>
-      <a:lvl9pPr marL="18653760" indent="-1097280" algn="l" defTabSz="2194560" rtl="0" eaLnBrk="1" latinLnBrk="0" hangingPunct="1">
+      <a:lvl9pPr marL="17103258" indent="-1006073" algn="l" defTabSz="2012147" rtl="0" eaLnBrk="1" latinLnBrk="0" hangingPunct="1">
         <a:spcBef>
           <a:spcPct val="20000"/>
         </a:spcBef>
         <a:buFont typeface="Arial"/>
         <a:buChar char="•"/>
-        <a:defRPr sz="9600" kern="1200">
+        <a:defRPr sz="8800" kern="1200">
           <a:solidFill>
             <a:schemeClr val="tx1"/>
           </a:solidFill>
@@ -3976,8 +3976,8 @@
       <a:defPPr>
         <a:defRPr lang="en-US"/>
       </a:defPPr>
-      <a:lvl1pPr marL="0" algn="l" defTabSz="2194560" rtl="0" eaLnBrk="1" latinLnBrk="0" hangingPunct="1">
-        <a:defRPr sz="8600" kern="1200">
+      <a:lvl1pPr marL="0" algn="l" defTabSz="2012147" rtl="0" eaLnBrk="1" latinLnBrk="0" hangingPunct="1">
+        <a:defRPr sz="7885" kern="1200">
           <a:solidFill>
             <a:schemeClr val="tx1"/>
           </a:solidFill>
@@ -3986,8 +3986,8 @@
           <a:cs typeface="+mn-cs"/>
         </a:defRPr>
       </a:lvl1pPr>
-      <a:lvl2pPr marL="2194560" algn="l" defTabSz="2194560" rtl="0" eaLnBrk="1" latinLnBrk="0" hangingPunct="1">
-        <a:defRPr sz="8600" kern="1200">
+      <a:lvl2pPr marL="2012147" algn="l" defTabSz="2012147" rtl="0" eaLnBrk="1" latinLnBrk="0" hangingPunct="1">
+        <a:defRPr sz="7885" kern="1200">
           <a:solidFill>
             <a:schemeClr val="tx1"/>
           </a:solidFill>
@@ -3996,8 +3996,8 @@
           <a:cs typeface="+mn-cs"/>
         </a:defRPr>
       </a:lvl2pPr>
-      <a:lvl3pPr marL="4389120" algn="l" defTabSz="2194560" rtl="0" eaLnBrk="1" latinLnBrk="0" hangingPunct="1">
-        <a:defRPr sz="8600" kern="1200">
+      <a:lvl3pPr marL="4024296" algn="l" defTabSz="2012147" rtl="0" eaLnBrk="1" latinLnBrk="0" hangingPunct="1">
+        <a:defRPr sz="7885" kern="1200">
           <a:solidFill>
             <a:schemeClr val="tx1"/>
           </a:solidFill>
@@ -4006,8 +4006,8 @@
           <a:cs typeface="+mn-cs"/>
         </a:defRPr>
       </a:lvl3pPr>
-      <a:lvl4pPr marL="6583680" algn="l" defTabSz="2194560" rtl="0" eaLnBrk="1" latinLnBrk="0" hangingPunct="1">
-        <a:defRPr sz="8600" kern="1200">
+      <a:lvl4pPr marL="6036442" algn="l" defTabSz="2012147" rtl="0" eaLnBrk="1" latinLnBrk="0" hangingPunct="1">
+        <a:defRPr sz="7885" kern="1200">
           <a:solidFill>
             <a:schemeClr val="tx1"/>
           </a:solidFill>
@@ -4016,8 +4016,8 @@
           <a:cs typeface="+mn-cs"/>
         </a:defRPr>
       </a:lvl4pPr>
-      <a:lvl5pPr marL="8778240" algn="l" defTabSz="2194560" rtl="0" eaLnBrk="1" latinLnBrk="0" hangingPunct="1">
-        <a:defRPr sz="8600" kern="1200">
+      <a:lvl5pPr marL="8048591" algn="l" defTabSz="2012147" rtl="0" eaLnBrk="1" latinLnBrk="0" hangingPunct="1">
+        <a:defRPr sz="7885" kern="1200">
           <a:solidFill>
             <a:schemeClr val="tx1"/>
           </a:solidFill>
@@ -4026,8 +4026,8 @@
           <a:cs typeface="+mn-cs"/>
         </a:defRPr>
       </a:lvl5pPr>
-      <a:lvl6pPr marL="10972800" algn="l" defTabSz="2194560" rtl="0" eaLnBrk="1" latinLnBrk="0" hangingPunct="1">
-        <a:defRPr sz="8600" kern="1200">
+      <a:lvl6pPr marL="10060740" algn="l" defTabSz="2012147" rtl="0" eaLnBrk="1" latinLnBrk="0" hangingPunct="1">
+        <a:defRPr sz="7885" kern="1200">
           <a:solidFill>
             <a:schemeClr val="tx1"/>
           </a:solidFill>
@@ -4036,8 +4036,8 @@
           <a:cs typeface="+mn-cs"/>
         </a:defRPr>
       </a:lvl6pPr>
-      <a:lvl7pPr marL="13167360" algn="l" defTabSz="2194560" rtl="0" eaLnBrk="1" latinLnBrk="0" hangingPunct="1">
-        <a:defRPr sz="8600" kern="1200">
+      <a:lvl7pPr marL="12072887" algn="l" defTabSz="2012147" rtl="0" eaLnBrk="1" latinLnBrk="0" hangingPunct="1">
+        <a:defRPr sz="7885" kern="1200">
           <a:solidFill>
             <a:schemeClr val="tx1"/>
           </a:solidFill>
@@ -4046,8 +4046,8 @@
           <a:cs typeface="+mn-cs"/>
         </a:defRPr>
       </a:lvl7pPr>
-      <a:lvl8pPr marL="15361920" algn="l" defTabSz="2194560" rtl="0" eaLnBrk="1" latinLnBrk="0" hangingPunct="1">
-        <a:defRPr sz="8600" kern="1200">
+      <a:lvl8pPr marL="14085036" algn="l" defTabSz="2012147" rtl="0" eaLnBrk="1" latinLnBrk="0" hangingPunct="1">
+        <a:defRPr sz="7885" kern="1200">
           <a:solidFill>
             <a:schemeClr val="tx1"/>
           </a:solidFill>
@@ -4056,8 +4056,8 @@
           <a:cs typeface="+mn-cs"/>
         </a:defRPr>
       </a:lvl8pPr>
-      <a:lvl9pPr marL="17556480" algn="l" defTabSz="2194560" rtl="0" eaLnBrk="1" latinLnBrk="0" hangingPunct="1">
-        <a:defRPr sz="8600" kern="1200">
+      <a:lvl9pPr marL="16097182" algn="l" defTabSz="2012147" rtl="0" eaLnBrk="1" latinLnBrk="0" hangingPunct="1">
+        <a:defRPr sz="7885" kern="1200">
           <a:solidFill>
             <a:schemeClr val="tx1"/>
           </a:solidFill>
@@ -4098,8 +4098,8 @@
         </p:nvSpPr>
         <p:spPr bwMode="auto">
           <a:xfrm>
-            <a:off x="1143000" y="2163763"/>
-            <a:ext cx="41605200" cy="1292447"/>
+            <a:off x="1047750" y="2260494"/>
+            <a:ext cx="38138100" cy="1184937"/>
           </a:xfrm>
           <a:prstGeom prst="rect">
             <a:avLst/>
@@ -4129,7 +4129,7 @@
           </a:extLst>
         </p:spPr>
         <p:txBody>
-          <a:bodyPr lIns="91243" tIns="45614" rIns="91243" bIns="45614">
+          <a:bodyPr lIns="83639" tIns="41813" rIns="83639" bIns="41813">
             <a:spAutoFit/>
           </a:bodyPr>
           <a:lstStyle>
@@ -4246,34 +4246,16 @@
               </a:spcBef>
             </a:pPr>
             <a:r>
-              <a:rPr lang="en-US" altLang="x-none" sz="5000" b="1" dirty="0" smtClean="0">
+              <a:rPr lang="en-US" altLang="x-none" sz="4584" b="1" dirty="0">
                 <a:solidFill>
                   <a:schemeClr val="tx2"/>
                 </a:solidFill>
                 <a:latin typeface="Georgia" charset="0"/>
               </a:rPr>
-              <a:t>Andrey Zaytsev, Jerry Guo, </a:t>
-            </a:r>
-            <a:r>
-              <a:rPr lang="en-US" altLang="x-none" sz="5000" b="1" dirty="0" smtClean="0">
-                <a:solidFill>
-                  <a:schemeClr val="tx2"/>
-                </a:solidFill>
-                <a:latin typeface="Georgia" charset="0"/>
-              </a:rPr>
-              <a:t>Shubhendra Chauhan, </a:t>
-            </a:r>
-            <a:r>
-              <a:rPr lang="en-US" altLang="x-none" sz="5000" b="1" dirty="0" smtClean="0">
-                <a:solidFill>
-                  <a:schemeClr val="tx2"/>
-                </a:solidFill>
-                <a:latin typeface="Georgia" charset="0"/>
-              </a:rPr>
-              <a:t>Yiming Wang </a:t>
-            </a:r>
-            <a:r>
-              <a:rPr lang="en-US" altLang="x-none" sz="4800" b="1" dirty="0" smtClean="0">
+              <a:t>Andrey Zaytsev, Jerry Guo, Shubhendra Chauhan, Yiming Wang </a:t>
+            </a:r>
+            <a:r>
+              <a:rPr lang="en-US" altLang="x-none" sz="4400" b="1" dirty="0">
                 <a:solidFill>
                   <a:schemeClr val="tx2"/>
                 </a:solidFill>
@@ -4282,7 +4264,7 @@
               <a:t/>
             </a:r>
             <a:br>
-              <a:rPr lang="en-US" altLang="x-none" sz="4800" b="1" dirty="0" smtClean="0">
+              <a:rPr lang="en-US" altLang="x-none" sz="4400" b="1" dirty="0">
                 <a:solidFill>
                   <a:schemeClr val="tx2"/>
                 </a:solidFill>
@@ -4290,58 +4272,13 @@
               </a:rPr>
             </a:br>
             <a:r>
-              <a:rPr lang="en-US" altLang="x-none" sz="2800" b="1" dirty="0" smtClean="0">
+              <a:rPr lang="en-US" altLang="x-none" sz="2567" b="1" dirty="0">
                 <a:solidFill>
                   <a:schemeClr val="tx2"/>
                 </a:solidFill>
                 <a:latin typeface="Georgia" charset="0"/>
               </a:rPr>
-              <a:t>Department </a:t>
-            </a:r>
-            <a:r>
-              <a:rPr lang="en-US" altLang="x-none" sz="2800" b="1" dirty="0">
-                <a:solidFill>
-                  <a:schemeClr val="tx2"/>
-                </a:solidFill>
-                <a:latin typeface="Georgia" charset="0"/>
-              </a:rPr>
-              <a:t>of </a:t>
-            </a:r>
-            <a:r>
-              <a:rPr lang="en-US" altLang="x-none" sz="2800" b="1" dirty="0" smtClean="0">
-                <a:solidFill>
-                  <a:schemeClr val="tx2"/>
-                </a:solidFill>
-                <a:latin typeface="Georgia" charset="0"/>
-              </a:rPr>
-              <a:t>Computer Science, </a:t>
-            </a:r>
-            <a:r>
-              <a:rPr lang="en-US" altLang="x-none" sz="2800" b="1" dirty="0">
-                <a:solidFill>
-                  <a:schemeClr val="tx2"/>
-                </a:solidFill>
-                <a:latin typeface="Georgia" charset="0"/>
-              </a:rPr>
-              <a:t>College of </a:t>
-            </a:r>
-            <a:r>
-              <a:rPr lang="en-US" altLang="x-none" sz="2800" b="1" dirty="0" smtClean="0">
-                <a:solidFill>
-                  <a:schemeClr val="tx2"/>
-                </a:solidFill>
-                <a:latin typeface="Georgia" charset="0"/>
-              </a:rPr>
-              <a:t>Engineering, </a:t>
-            </a:r>
-            <a:r>
-              <a:rPr lang="en-US" altLang="x-none" sz="2800" b="1" dirty="0">
-                <a:solidFill>
-                  <a:schemeClr val="tx2"/>
-                </a:solidFill>
-                <a:latin typeface="Georgia" charset="0"/>
-              </a:rPr>
-              <a:t>University of Illinois at Urbana-Champaign</a:t>
+              <a:t>Department of Computer Science, College of Engineering, University of Illinois at Urbana-Champaign</a:t>
             </a:r>
           </a:p>
         </p:txBody>
@@ -4356,8 +4293,8 @@
         </p:nvSpPr>
         <p:spPr bwMode="auto">
           <a:xfrm>
-            <a:off x="1143000" y="609600"/>
-            <a:ext cx="41605200" cy="1446213"/>
+            <a:off x="1047750" y="1016001"/>
+            <a:ext cx="38138100" cy="1333763"/>
           </a:xfrm>
           <a:prstGeom prst="rect">
             <a:avLst/>
@@ -4500,14 +4437,11 @@
           <a:p>
             <a:pPr eaLnBrk="1" hangingPunct="1"/>
             <a:r>
-              <a:rPr lang="en-US" altLang="x-none" sz="8800" dirty="0" smtClean="0">
+              <a:rPr lang="en-US" altLang="x-none" sz="8067" dirty="0">
                 <a:latin typeface="Arial Black" charset="0"/>
               </a:rPr>
-              <a:t>Pedestrian Detection in Consecutive Frames </a:t>
-            </a:r>
-            <a:endParaRPr lang="en-US" altLang="x-none" sz="8800" dirty="0">
-              <a:latin typeface="Arial Black" charset="0"/>
-            </a:endParaRPr>
+              <a:t>Real-time Pedestrian Detection in Consecutive Frames </a:t>
+            </a:r>
           </a:p>
         </p:txBody>
       </p:sp>
@@ -4521,8 +4455,8 @@
         </p:nvSpPr>
         <p:spPr bwMode="auto">
           <a:xfrm>
-            <a:off x="32918400" y="24993600"/>
-            <a:ext cx="9829800" cy="4191000"/>
+            <a:off x="30175200" y="23368000"/>
+            <a:ext cx="9010650" cy="3841750"/>
           </a:xfrm>
           <a:prstGeom prst="rect">
             <a:avLst/>
@@ -4547,7 +4481,7 @@
           </a:extLst>
         </p:spPr>
         <p:txBody>
-          <a:bodyPr lIns="360000" tIns="360000" rIns="360000" bIns="360000"/>
+          <a:bodyPr lIns="330000" tIns="330000" rIns="330000" bIns="330000"/>
           <a:lstStyle>
             <a:lvl1pPr eaLnBrk="0" hangingPunct="0">
               <a:defRPr sz="8600">
@@ -4662,14 +4596,14 @@
               </a:spcBef>
             </a:pPr>
             <a:r>
-              <a:rPr lang="en-GB" altLang="x-none" sz="4000" b="1" u="sng" dirty="0">
+              <a:rPr lang="en-GB" altLang="x-none" sz="3667" b="1" u="sng" dirty="0">
                 <a:solidFill>
                   <a:srgbClr val="131F33"/>
                 </a:solidFill>
               </a:rPr>
               <a:t>ACKNOWLEDGEMENTS</a:t>
             </a:r>
-            <a:endParaRPr lang="en-GB" altLang="x-none" sz="4000" b="1" dirty="0">
+            <a:endParaRPr lang="en-GB" altLang="x-none" sz="3667" b="1" dirty="0">
               <a:solidFill>
                 <a:srgbClr val="131F33"/>
               </a:solidFill>
@@ -4677,19 +4611,16 @@
           </a:p>
           <a:p>
             <a:pPr eaLnBrk="1" hangingPunct="1"/>
-            <a:endParaRPr lang="en-US" altLang="x-none" sz="2800" dirty="0"/>
+            <a:endParaRPr lang="en-US" altLang="x-none" sz="2567" dirty="0"/>
           </a:p>
           <a:p>
             <a:pPr algn="just" eaLnBrk="1" hangingPunct="1"/>
             <a:r>
-              <a:rPr lang="en-US" altLang="x-none" sz="2800" dirty="0" smtClean="0">
+              <a:rPr lang="en-US" altLang="x-none" sz="2567" dirty="0">
                 <a:latin typeface="Georgia" charset="0"/>
               </a:rPr>
-              <a:t>We used the Matlab libraries provided by the Computer Vision Toolbox. In addition, the frames are taken from the Caltech’s Pedestrian Detection Dataset.</a:t>
-            </a:r>
-            <a:endParaRPr lang="en-US" altLang="x-none" sz="2800" dirty="0">
-              <a:latin typeface="Georgia" charset="0"/>
-            </a:endParaRPr>
+              <a:t>We used the Matlab libraries provided by the Computer Vision Toolbox. In addition, the frames are taken from the Caltech Pedestrian Detection Dataset.</a:t>
+            </a:r>
           </a:p>
         </p:txBody>
       </p:sp>
@@ -4703,8 +4634,8 @@
         </p:nvSpPr>
         <p:spPr bwMode="auto">
           <a:xfrm>
-            <a:off x="1143000" y="22021800"/>
-            <a:ext cx="9829800" cy="10210800"/>
+            <a:off x="1047750" y="20643850"/>
+            <a:ext cx="9010650" cy="9359900"/>
           </a:xfrm>
           <a:prstGeom prst="rect">
             <a:avLst/>
@@ -4729,7 +4660,7 @@
           </a:extLst>
         </p:spPr>
         <p:txBody>
-          <a:bodyPr lIns="360000" tIns="360000" rIns="360000" bIns="360000"/>
+          <a:bodyPr lIns="330000" tIns="330000" rIns="330000" bIns="330000"/>
           <a:lstStyle>
             <a:lvl1pPr eaLnBrk="0" hangingPunct="0">
               <a:defRPr sz="8600">
@@ -4844,14 +4775,14 @@
               </a:spcBef>
             </a:pPr>
             <a:r>
-              <a:rPr lang="en-GB" altLang="x-none" sz="4000" b="1" u="sng" dirty="0" smtClean="0">
+              <a:rPr lang="en-GB" altLang="x-none" sz="3667" b="1" u="sng" dirty="0">
                 <a:solidFill>
                   <a:srgbClr val="131F33"/>
                 </a:solidFill>
               </a:rPr>
               <a:t>APPROACH</a:t>
             </a:r>
-            <a:endParaRPr lang="en-GB" altLang="x-none" sz="4000" b="1" dirty="0">
+            <a:endParaRPr lang="en-GB" altLang="x-none" sz="3667" b="1" dirty="0">
               <a:solidFill>
                 <a:srgbClr val="131F33"/>
               </a:solidFill>
@@ -4860,14 +4791,14 @@
           <a:p>
             <a:pPr eaLnBrk="1" hangingPunct="1"/>
             <a:r>
-              <a:rPr lang="en-US" altLang="x-none" sz="2800" dirty="0"/>
+              <a:rPr lang="en-US" altLang="x-none" sz="2567" dirty="0"/>
               <a:t> </a:t>
             </a:r>
           </a:p>
           <a:p>
             <a:pPr algn="just" eaLnBrk="1" hangingPunct="1"/>
             <a:r>
-              <a:rPr lang="en-US" altLang="x-none" sz="2800" dirty="0" smtClean="0">
+              <a:rPr lang="en-US" altLang="x-none" sz="2567" dirty="0">
                 <a:latin typeface="Georgia" charset="0"/>
               </a:rPr>
               <a:t>In order to improve the accuracy of a static person detector, we make use of the continuity of the frames in a video. Specifically, we </a:t>
@@ -4876,12 +4807,12 @@
           <a:p>
             <a:pPr algn="just" eaLnBrk="1" hangingPunct="1"/>
             <a:r>
-              <a:rPr lang="en-US" altLang="x-none" sz="2800" dirty="0" smtClean="0">
+              <a:rPr lang="en-US" altLang="x-none" sz="2567" dirty="0">
                 <a:latin typeface="Georgia" charset="0"/>
               </a:rPr>
               <a:t>We use a combination of  HOG person detector, keypoint tracking, and automatic height estimation through vanishing point (VP) detection.</a:t>
             </a:r>
-            <a:endParaRPr lang="en-AU" altLang="x-none" sz="2800" dirty="0">
+            <a:endParaRPr lang="en-AU" altLang="x-none" sz="2567" dirty="0">
               <a:latin typeface="Georgia" charset="0"/>
             </a:endParaRPr>
           </a:p>
@@ -4897,8 +4828,8 @@
         </p:nvSpPr>
         <p:spPr bwMode="auto">
           <a:xfrm>
-            <a:off x="1143000" y="5181600"/>
-            <a:ext cx="9829800" cy="16383000"/>
+            <a:off x="1047750" y="5207000"/>
+            <a:ext cx="9010650" cy="15017750"/>
           </a:xfrm>
           <a:prstGeom prst="rect">
             <a:avLst/>
@@ -4923,7 +4854,7 @@
           </a:extLst>
         </p:spPr>
         <p:txBody>
-          <a:bodyPr lIns="360000" tIns="360000" rIns="360000" bIns="360000"/>
+          <a:bodyPr lIns="330000" tIns="330000" rIns="330000" bIns="330000"/>
           <a:lstStyle>
             <a:lvl1pPr eaLnBrk="0" hangingPunct="0">
               <a:defRPr sz="8600">
@@ -5038,7 +4969,7 @@
               </a:spcBef>
             </a:pPr>
             <a:r>
-              <a:rPr lang="en-GB" altLang="x-none" sz="4000" b="1" u="sng" dirty="0">
+              <a:rPr lang="en-GB" altLang="x-none" sz="3667" b="1" u="sng" dirty="0">
                 <a:solidFill>
                   <a:schemeClr val="accent1"/>
                 </a:solidFill>
@@ -5049,75 +4980,75 @@
           <a:p>
             <a:pPr eaLnBrk="1" hangingPunct="1"/>
             <a:r>
-              <a:rPr lang="en-US" altLang="x-none" sz="2800" b="1" dirty="0"/>
+              <a:rPr lang="en-US" altLang="x-none" sz="2567" b="1" dirty="0"/>
               <a:t> </a:t>
             </a:r>
-            <a:endParaRPr lang="en-US" altLang="x-none" sz="2800" dirty="0"/>
+            <a:endParaRPr lang="en-US" altLang="x-none" sz="2567" dirty="0"/>
           </a:p>
           <a:p>
             <a:pPr eaLnBrk="1" hangingPunct="1"/>
-            <a:endParaRPr lang="en-US" altLang="x-none" sz="2800" dirty="0" smtClean="0">
+            <a:endParaRPr lang="en-US" altLang="x-none" sz="2567" dirty="0">
               <a:latin typeface="Georgia" charset="0"/>
             </a:endParaRPr>
           </a:p>
           <a:p>
             <a:pPr eaLnBrk="1" hangingPunct="1"/>
-            <a:endParaRPr lang="en-US" altLang="x-none" sz="2800" dirty="0">
+            <a:endParaRPr lang="en-US" altLang="x-none" sz="2567" dirty="0">
               <a:latin typeface="Georgia" charset="0"/>
             </a:endParaRPr>
           </a:p>
           <a:p>
             <a:pPr eaLnBrk="1" hangingPunct="1"/>
-            <a:endParaRPr lang="en-US" altLang="x-none" sz="2800" dirty="0" smtClean="0">
+            <a:endParaRPr lang="en-US" altLang="x-none" sz="2567" dirty="0">
               <a:latin typeface="Georgia" charset="0"/>
             </a:endParaRPr>
           </a:p>
           <a:p>
             <a:pPr eaLnBrk="1" hangingPunct="1"/>
-            <a:endParaRPr lang="en-US" altLang="x-none" sz="2800" dirty="0">
+            <a:endParaRPr lang="en-US" altLang="x-none" sz="2567" dirty="0">
               <a:latin typeface="Georgia" charset="0"/>
             </a:endParaRPr>
           </a:p>
           <a:p>
             <a:pPr eaLnBrk="1" hangingPunct="1"/>
-            <a:endParaRPr lang="en-US" altLang="x-none" sz="2800" dirty="0" smtClean="0">
+            <a:endParaRPr lang="en-US" altLang="x-none" sz="2567" dirty="0">
               <a:latin typeface="Georgia" charset="0"/>
             </a:endParaRPr>
           </a:p>
           <a:p>
             <a:pPr eaLnBrk="1" hangingPunct="1"/>
-            <a:endParaRPr lang="en-US" altLang="x-none" sz="2800" dirty="0">
+            <a:endParaRPr lang="en-US" altLang="x-none" sz="2567" dirty="0">
               <a:latin typeface="Georgia" charset="0"/>
             </a:endParaRPr>
           </a:p>
           <a:p>
             <a:pPr eaLnBrk="1" hangingPunct="1"/>
-            <a:endParaRPr lang="en-US" altLang="x-none" sz="2800" dirty="0" smtClean="0">
+            <a:endParaRPr lang="en-US" altLang="x-none" sz="2567" dirty="0">
               <a:latin typeface="Georgia" charset="0"/>
             </a:endParaRPr>
           </a:p>
           <a:p>
             <a:pPr eaLnBrk="1" hangingPunct="1"/>
-            <a:endParaRPr lang="en-US" altLang="x-none" sz="2800" dirty="0">
+            <a:endParaRPr lang="en-US" altLang="x-none" sz="2567" dirty="0">
               <a:latin typeface="Georgia" charset="0"/>
             </a:endParaRPr>
           </a:p>
           <a:p>
             <a:pPr eaLnBrk="1" hangingPunct="1"/>
-            <a:endParaRPr lang="en-US" altLang="x-none" sz="2800" dirty="0" smtClean="0">
+            <a:endParaRPr lang="en-US" altLang="x-none" sz="2567" dirty="0">
               <a:latin typeface="Georgia" charset="0"/>
             </a:endParaRPr>
           </a:p>
           <a:p>
             <a:pPr eaLnBrk="1" hangingPunct="1"/>
-            <a:endParaRPr lang="en-US" altLang="x-none" sz="2800" dirty="0" smtClean="0">
+            <a:endParaRPr lang="en-US" altLang="x-none" sz="2567" dirty="0">
               <a:latin typeface="Georgia" charset="0"/>
             </a:endParaRPr>
           </a:p>
           <a:p>
             <a:pPr algn="just" eaLnBrk="1" hangingPunct="1"/>
             <a:r>
-              <a:rPr lang="en-US" altLang="x-none" sz="2800" dirty="0" smtClean="0">
+              <a:rPr lang="en-US" altLang="x-none" sz="2567" dirty="0">
                 <a:latin typeface="Georgia" charset="0"/>
               </a:rPr>
               <a:t>The problem of pedestrian detection is a vital part of autonomous driving. Cars need to know where the pedestrians are not only for the purposes of safety, but also for tasks such as picking passengers up, getting background information about the environment, as well as getting more accurate location information. </a:t>
@@ -5126,19 +5057,16 @@
           <a:p>
             <a:pPr algn="just" eaLnBrk="1" hangingPunct="1"/>
             <a:r>
-              <a:rPr lang="en-US" altLang="ja-JP" sz="2800" dirty="0" smtClean="0">
+              <a:rPr lang="en-US" altLang="ja-JP" sz="2567" dirty="0">
                 <a:latin typeface="Georgia" charset="0"/>
               </a:rPr>
               <a:t>For instance, if there are a lot of people standing on the curb, one may infer that the car is driving through an airport. In addition, seeing a lot of pedestrians cross the road in front of the car allows us to conclude that there must be a red light even if it is obscured by some other objects.</a:t>
             </a:r>
-            <a:endParaRPr lang="en-US" altLang="ja-JP" sz="2800" dirty="0">
-              <a:latin typeface="Georgia" charset="0"/>
-            </a:endParaRPr>
           </a:p>
           <a:p>
             <a:pPr eaLnBrk="1" hangingPunct="1"/>
             <a:r>
-              <a:rPr lang="en-US" altLang="x-none" sz="2800" dirty="0">
+              <a:rPr lang="en-US" altLang="x-none" sz="2567" dirty="0">
                 <a:latin typeface="Georgia" charset="0"/>
               </a:rPr>
               <a:t> </a:t>
@@ -5147,26 +5075,23 @@
           <a:p>
             <a:pPr eaLnBrk="1" hangingPunct="1"/>
             <a:r>
-              <a:rPr lang="en-US" altLang="x-none" sz="2800" b="1" dirty="0" smtClean="0">
+              <a:rPr lang="en-US" altLang="x-none" sz="2567" b="1" dirty="0">
                 <a:latin typeface="Georgia" charset="0"/>
               </a:rPr>
               <a:t>Challenges</a:t>
             </a:r>
-            <a:endParaRPr lang="en-US" altLang="x-none" sz="2800" dirty="0">
+            <a:endParaRPr lang="en-US" altLang="x-none" sz="2567" dirty="0">
               <a:latin typeface="Georgia" charset="0"/>
             </a:endParaRPr>
           </a:p>
           <a:p>
             <a:pPr algn="just" eaLnBrk="1" hangingPunct="1"/>
             <a:r>
-              <a:rPr lang="en-US" altLang="x-none" sz="2800" dirty="0" smtClean="0">
+              <a:rPr lang="en-US" altLang="x-none" sz="2567" dirty="0">
                 <a:latin typeface="Georgia" charset="0"/>
               </a:rPr>
-              <a:t>In contrast to a static camera, where people can be easily detected using any trivial motion subtraction algorithms, pedestrian detection is a more complex problem. Since a camera mounted on a car is constantly moving, one needs to be able to detect people on any</a:t>
-            </a:r>
-            <a:endParaRPr lang="en-US" altLang="x-none" sz="2800" dirty="0">
-              <a:latin typeface="Georgia" charset="0"/>
-            </a:endParaRPr>
+              <a:t>In contrast to a static camera, where people can be easily detected using any trivial background subtraction algorithms, pedestrian detection is a more complex problem. Since a camera mounted on a car is constantly moving, one needs to be able to detect people on any</a:t>
+            </a:r>
           </a:p>
         </p:txBody>
       </p:sp>
@@ -5180,8 +5105,8 @@
         </p:nvSpPr>
         <p:spPr bwMode="auto">
           <a:xfrm>
-            <a:off x="11734800" y="5181600"/>
-            <a:ext cx="9829800" cy="27051000"/>
+            <a:off x="10756900" y="5207000"/>
+            <a:ext cx="9010650" cy="24796750"/>
           </a:xfrm>
           <a:prstGeom prst="rect">
             <a:avLst/>
@@ -5206,7 +5131,7 @@
           </a:extLst>
         </p:spPr>
         <p:txBody>
-          <a:bodyPr lIns="360000" tIns="360000" rIns="360000" bIns="360000"/>
+          <a:bodyPr lIns="330000" tIns="330000" rIns="330000" bIns="330000"/>
           <a:lstStyle>
             <a:lvl1pPr marL="381000" indent="-381000" eaLnBrk="0" hangingPunct="0">
               <a:defRPr sz="8600">
@@ -5321,14 +5246,14 @@
               </a:spcBef>
             </a:pPr>
             <a:r>
-              <a:rPr lang="en-GB" altLang="x-none" sz="4000" b="1" u="sng" dirty="0" smtClean="0">
+              <a:rPr lang="en-GB" altLang="x-none" sz="3667" b="1" u="sng" dirty="0">
                 <a:solidFill>
                   <a:srgbClr val="131F33"/>
                 </a:solidFill>
               </a:rPr>
               <a:t>METHOD</a:t>
             </a:r>
-            <a:endParaRPr lang="en-GB" altLang="x-none" sz="4000" b="1" dirty="0" smtClean="0">
+            <a:endParaRPr lang="en-GB" altLang="x-none" sz="3667" b="1" dirty="0">
               <a:solidFill>
                 <a:srgbClr val="131F33"/>
               </a:solidFill>
@@ -5336,24 +5261,24 @@
           </a:p>
           <a:p>
             <a:pPr eaLnBrk="1" hangingPunct="1"/>
-            <a:endParaRPr lang="en-US" altLang="x-none" sz="2800" b="1" dirty="0" smtClean="0"/>
+            <a:endParaRPr lang="en-US" altLang="x-none" sz="2567" b="1" dirty="0"/>
           </a:p>
           <a:p>
             <a:pPr eaLnBrk="1" hangingPunct="1"/>
             <a:r>
-              <a:rPr lang="en-US" altLang="x-none" sz="2800" b="1" dirty="0" smtClean="0">
+              <a:rPr lang="en-US" altLang="x-none" sz="2567" b="1" dirty="0">
                 <a:latin typeface="Georgia" charset="0"/>
               </a:rPr>
               <a:t>HOG Person Detection</a:t>
             </a:r>
-            <a:endParaRPr lang="en-US" altLang="x-none" sz="2800" dirty="0" smtClean="0">
+            <a:endParaRPr lang="en-US" altLang="x-none" sz="2567" dirty="0">
               <a:latin typeface="Georgia" charset="0"/>
             </a:endParaRPr>
           </a:p>
           <a:p>
             <a:pPr eaLnBrk="1" hangingPunct="1"/>
             <a:r>
-              <a:rPr lang="en-US" altLang="x-none" sz="2800" dirty="0" smtClean="0">
+              <a:rPr lang="en-US" altLang="x-none" sz="2567" dirty="0">
                 <a:latin typeface="Georgia" charset="0"/>
               </a:rPr>
               <a:t>We used HOG-person detector as the base pedestrian detector.</a:t>
@@ -5361,32 +5286,32 @@
           </a:p>
           <a:p>
             <a:pPr eaLnBrk="1" hangingPunct="1"/>
-            <a:endParaRPr lang="en-US" altLang="x-none" sz="2800" dirty="0">
+            <a:endParaRPr lang="en-US" altLang="x-none" sz="2567" dirty="0">
               <a:latin typeface="Georgia" charset="0"/>
             </a:endParaRPr>
           </a:p>
           <a:p>
             <a:pPr eaLnBrk="1" hangingPunct="1"/>
             <a:r>
-              <a:rPr lang="en-US" altLang="x-none" sz="2800" b="1" dirty="0" smtClean="0">
+              <a:rPr lang="en-US" altLang="x-none" sz="2567" b="1" dirty="0">
                 <a:latin typeface="Georgia" charset="0"/>
               </a:rPr>
               <a:t>Keypoint Tracking</a:t>
             </a:r>
-            <a:endParaRPr lang="en-US" altLang="x-none" sz="2800" dirty="0" smtClean="0">
+            <a:endParaRPr lang="en-US" altLang="x-none" sz="2567" dirty="0">
               <a:latin typeface="Georgia" charset="0"/>
             </a:endParaRPr>
           </a:p>
           <a:p>
             <a:pPr eaLnBrk="1" hangingPunct="1"/>
-            <a:endParaRPr lang="en-US" altLang="x-none" sz="2800" dirty="0" smtClean="0">
+            <a:endParaRPr lang="en-US" altLang="x-none" sz="2567" dirty="0">
               <a:latin typeface="Georgia" charset="0"/>
             </a:endParaRPr>
           </a:p>
           <a:p>
             <a:pPr eaLnBrk="1" hangingPunct="1"/>
             <a:r>
-              <a:rPr lang="en-US" altLang="x-none" sz="2800" dirty="0" smtClean="0">
+              <a:rPr lang="en-US" altLang="x-none" sz="2567" dirty="0">
                 <a:latin typeface="Georgia" charset="0"/>
               </a:rPr>
               <a:t>Keypoint tracking is done using Kalman filters.</a:t>
@@ -5394,39 +5319,36 @@
           </a:p>
           <a:p>
             <a:pPr eaLnBrk="1" hangingPunct="1"/>
-            <a:endParaRPr lang="en-US" altLang="x-none" sz="2800" dirty="0">
+            <a:endParaRPr lang="en-US" altLang="x-none" sz="2567" dirty="0">
               <a:latin typeface="Georgia" charset="0"/>
             </a:endParaRPr>
           </a:p>
           <a:p>
             <a:pPr eaLnBrk="1" hangingPunct="1"/>
             <a:r>
-              <a:rPr lang="en-US" altLang="x-none" sz="2800" b="1" dirty="0" smtClean="0">
+              <a:rPr lang="en-US" altLang="x-none" sz="2567" b="1" dirty="0">
                 <a:latin typeface="Georgia" charset="0"/>
               </a:rPr>
               <a:t>Automatic Height Estimation</a:t>
             </a:r>
-            <a:endParaRPr lang="en-US" altLang="x-none" sz="2800" dirty="0" smtClean="0">
+            <a:endParaRPr lang="en-US" altLang="x-none" sz="2567" dirty="0">
               <a:latin typeface="Georgia" charset="0"/>
             </a:endParaRPr>
           </a:p>
           <a:p>
             <a:pPr eaLnBrk="1" hangingPunct="1"/>
-            <a:endParaRPr lang="en-US" altLang="x-none" sz="2800" dirty="0">
+            <a:endParaRPr lang="en-US" altLang="x-none" sz="2567" dirty="0">
               <a:latin typeface="Georgia" charset="0"/>
             </a:endParaRPr>
           </a:p>
           <a:p>
             <a:pPr eaLnBrk="1" hangingPunct="1"/>
             <a:r>
-              <a:rPr lang="en-US" altLang="x-none" sz="2800" dirty="0" smtClean="0">
+              <a:rPr lang="en-US" altLang="x-none" sz="2567" dirty="0">
                 <a:latin typeface="Georgia" charset="0"/>
               </a:rPr>
               <a:t>In order to do automatic height estimation, we first find horizontal vanishing points in the image.</a:t>
             </a:r>
-            <a:endParaRPr lang="en-US" altLang="x-none" sz="2800" dirty="0">
-              <a:latin typeface="Georgia" charset="0"/>
-            </a:endParaRPr>
           </a:p>
         </p:txBody>
       </p:sp>
@@ -5440,8 +5362,8 @@
         </p:nvSpPr>
         <p:spPr bwMode="auto">
           <a:xfrm>
-            <a:off x="22326600" y="5181600"/>
-            <a:ext cx="9829800" cy="27051000"/>
+            <a:off x="20466050" y="5207000"/>
+            <a:ext cx="9010650" cy="24796750"/>
           </a:xfrm>
           <a:prstGeom prst="rect">
             <a:avLst/>
@@ -5466,7 +5388,7 @@
           </a:extLst>
         </p:spPr>
         <p:txBody>
-          <a:bodyPr lIns="360000" tIns="360000" rIns="360000" bIns="360000"/>
+          <a:bodyPr lIns="330000" tIns="330000" rIns="330000" bIns="330000"/>
           <a:lstStyle>
             <a:lvl1pPr eaLnBrk="0" hangingPunct="0">
               <a:defRPr sz="8600">
@@ -5581,14 +5503,14 @@
               </a:spcBef>
             </a:pPr>
             <a:r>
-              <a:rPr lang="en-GB" altLang="x-none" sz="4000" b="1" u="sng" dirty="0">
+              <a:rPr lang="en-GB" altLang="x-none" sz="3667" b="1" u="sng" dirty="0">
                 <a:solidFill>
                   <a:srgbClr val="131F33"/>
                 </a:solidFill>
               </a:rPr>
               <a:t>RESULTS</a:t>
             </a:r>
-            <a:endParaRPr lang="en-GB" altLang="x-none" sz="4000" b="1" dirty="0">
+            <a:endParaRPr lang="en-GB" altLang="x-none" sz="3667" b="1" dirty="0">
               <a:solidFill>
                 <a:srgbClr val="131F33"/>
               </a:solidFill>
@@ -5596,14 +5518,14 @@
           </a:p>
           <a:p>
             <a:pPr eaLnBrk="1" hangingPunct="1"/>
-            <a:endParaRPr lang="en-US" altLang="x-none" sz="2800" dirty="0">
+            <a:endParaRPr lang="en-US" altLang="x-none" sz="2567" dirty="0">
               <a:latin typeface="Georgia" charset="0"/>
             </a:endParaRPr>
           </a:p>
           <a:p>
             <a:pPr algn="just" eaLnBrk="1" hangingPunct="1"/>
             <a:r>
-              <a:rPr lang="en-US" altLang="x-none" sz="2800" dirty="0" smtClean="0">
+              <a:rPr lang="en-US" altLang="x-none" sz="2567" dirty="0">
                 <a:latin typeface="Georgia" charset="0"/>
               </a:rPr>
               <a:t>We achieved an improvement over the baseline HOG pedestrian detector by adding keypoint tracking and height estimation.</a:t>
@@ -5612,7 +5534,7 @@
           <a:p>
             <a:pPr algn="just" eaLnBrk="1" hangingPunct="1"/>
             <a:r>
-              <a:rPr lang="en-US" altLang="x-none" sz="2800" dirty="0" smtClean="0">
+              <a:rPr lang="en-US" altLang="x-none" sz="2567" dirty="0">
                 <a:latin typeface="Georgia" charset="0"/>
               </a:rPr>
               <a:t>One can see the difference between the original HOG and our improved version on the following sequences of frames:</a:t>
@@ -5620,20 +5542,20 @@
           </a:p>
           <a:p>
             <a:pPr algn="just" eaLnBrk="1" hangingPunct="1"/>
-            <a:endParaRPr lang="en-US" altLang="x-none" sz="2800" dirty="0">
+            <a:endParaRPr lang="en-US" altLang="x-none" sz="2567" dirty="0">
               <a:latin typeface="Georgia" charset="0"/>
             </a:endParaRPr>
           </a:p>
           <a:p>
             <a:pPr algn="just" eaLnBrk="1" hangingPunct="1"/>
-            <a:endParaRPr lang="en-US" altLang="x-none" sz="2800" dirty="0" smtClean="0">
+            <a:endParaRPr lang="en-US" altLang="x-none" sz="2567" dirty="0">
               <a:latin typeface="Georgia" charset="0"/>
             </a:endParaRPr>
           </a:p>
           <a:p>
             <a:pPr algn="just" eaLnBrk="1" hangingPunct="1"/>
             <a:r>
-              <a:rPr lang="en-US" altLang="x-none" sz="2800" dirty="0" smtClean="0">
+              <a:rPr lang="en-US" altLang="x-none" sz="2567" dirty="0">
                 <a:latin typeface="Georgia" charset="0"/>
               </a:rPr>
               <a:t>In the original sequence, the person on the right is lost by the second frame. This happens because the pedestrian detector does not have any information about the results of the previous frame.</a:t>
@@ -5642,7 +5564,7 @@
           <a:p>
             <a:pPr algn="just" eaLnBrk="1" hangingPunct="1"/>
             <a:r>
-              <a:rPr lang="en-US" altLang="x-none" sz="2800" dirty="0" smtClean="0">
+              <a:rPr lang="en-US" altLang="x-none" sz="2567" dirty="0">
                 <a:latin typeface="Georgia" charset="0"/>
               </a:rPr>
               <a:t>In comparison, our detector uses keypoint tracking, which allows us to detect the person on the second frame even though we get no data on him from the detector.</a:t>
@@ -5654,7 +5576,7 @@
                 <a:spcPct val="50000"/>
               </a:spcBef>
             </a:pPr>
-            <a:endParaRPr lang="en-US" altLang="x-none" sz="4000" b="1" dirty="0">
+            <a:endParaRPr lang="en-US" altLang="x-none" sz="3667" b="1" dirty="0">
               <a:solidFill>
                 <a:srgbClr val="CC3300"/>
               </a:solidFill>
@@ -5685,8 +5607,8 @@
         </p:blipFill>
         <p:spPr bwMode="auto">
           <a:xfrm>
-            <a:off x="36804600" y="31221363"/>
-            <a:ext cx="5929313" cy="1011237"/>
+            <a:off x="33737550" y="29076790"/>
+            <a:ext cx="5435204" cy="926967"/>
           </a:xfrm>
           <a:prstGeom prst="rect">
             <a:avLst/>
@@ -5726,8 +5648,8 @@
         </p:nvSpPr>
         <p:spPr bwMode="auto">
           <a:xfrm>
-            <a:off x="32904113" y="5181600"/>
-            <a:ext cx="9829800" cy="19126200"/>
+            <a:off x="30162104" y="14566900"/>
+            <a:ext cx="9010650" cy="8172450"/>
           </a:xfrm>
           <a:prstGeom prst="rect">
             <a:avLst/>
@@ -5752,7 +5674,7 @@
           </a:extLst>
         </p:spPr>
         <p:txBody>
-          <a:bodyPr lIns="360000" tIns="360000" rIns="360000" bIns="360000"/>
+          <a:bodyPr lIns="330000" tIns="330000" rIns="330000" bIns="330000"/>
           <a:lstStyle>
             <a:lvl1pPr eaLnBrk="0" hangingPunct="0">
               <a:defRPr sz="8600">
@@ -5867,7 +5789,7 @@
               </a:spcBef>
             </a:pPr>
             <a:r>
-              <a:rPr lang="en-GB" altLang="x-none" sz="4000" b="1" u="sng" dirty="0">
+              <a:rPr lang="en-GB" altLang="x-none" sz="3667" b="1" u="sng" dirty="0">
                 <a:solidFill>
                   <a:srgbClr val="131F33"/>
                 </a:solidFill>
@@ -5877,19 +5799,16 @@
           </a:p>
           <a:p>
             <a:pPr eaLnBrk="1" hangingPunct="1"/>
-            <a:endParaRPr lang="en-US" altLang="x-none" sz="2800" dirty="0"/>
+            <a:endParaRPr lang="en-US" altLang="x-none" sz="2567" dirty="0"/>
           </a:p>
           <a:p>
             <a:pPr algn="just" eaLnBrk="1" hangingPunct="1"/>
             <a:r>
-              <a:rPr lang="en-US" altLang="x-none" sz="2800" dirty="0" smtClean="0">
+              <a:rPr lang="en-US" altLang="x-none" sz="2567" dirty="0">
                 <a:latin typeface="Georgia" charset="0"/>
               </a:rPr>
               <a:t>By running our experiments and observing the improvement over traditional person detection methods, we conclude that it is vital to make use of the continuous nature of frames in videos.</a:t>
             </a:r>
-            <a:endParaRPr lang="en-US" altLang="x-none" sz="2800" dirty="0">
-              <a:latin typeface="Georgia" charset="0"/>
-            </a:endParaRPr>
           </a:p>
         </p:txBody>
       </p:sp>
@@ -5903,8 +5822,8 @@
         </p:nvSpPr>
         <p:spPr bwMode="auto">
           <a:xfrm>
-            <a:off x="7086600" y="8114162"/>
-            <a:ext cx="3505200" cy="979069"/>
+            <a:off x="6496050" y="7666022"/>
+            <a:ext cx="3213100" cy="2025609"/>
           </a:xfrm>
           <a:prstGeom prst="rect">
             <a:avLst/>
@@ -5934,7 +5853,7 @@
           </a:extLst>
         </p:spPr>
         <p:txBody>
-          <a:bodyPr lIns="180000" tIns="180000" rIns="180000" bIns="180000">
+          <a:bodyPr lIns="165000" tIns="165000" rIns="165000" bIns="165000">
             <a:spAutoFit/>
           </a:bodyPr>
           <a:lstStyle>
@@ -6045,16 +5964,19 @@
             </a:lvl9pPr>
           </a:lstStyle>
           <a:p>
-            <a:pPr algn="ctr" eaLnBrk="1" hangingPunct="1"/>
-            <a:r>
-              <a:rPr lang="en-US" altLang="x-none" sz="2000" i="1" dirty="0" smtClean="0"/>
-              <a:t>Example output of a </a:t>
-            </a:r>
-            <a:r>
-              <a:rPr lang="en-US" altLang="x-none" sz="2000" i="1" smtClean="0"/>
-              <a:t>pedestrian detector</a:t>
-            </a:r>
-            <a:endParaRPr lang="en-AU" altLang="x-none" sz="2000" i="1" dirty="0"/>
+            <a:pPr eaLnBrk="1" hangingPunct="1"/>
+            <a:r>
+              <a:rPr lang="en-US" altLang="x-none" sz="1833" i="1" dirty="0"/>
+              <a:t>Example output of a pedestrian detector.</a:t>
+            </a:r>
+          </a:p>
+          <a:p>
+            <a:pPr eaLnBrk="1" hangingPunct="1"/>
+            <a:r>
+              <a:rPr lang="en-US" altLang="x-none" sz="1833" i="1" dirty="0"/>
+              <a:t>The detected pedestrians are enclosed in yellow boxes with a provided score by the HOG detector.</a:t>
+            </a:r>
+            <a:endParaRPr lang="en-AU" altLang="x-none" sz="1833" i="1" dirty="0"/>
           </a:p>
         </p:txBody>
       </p:sp>
@@ -6079,8 +6001,8 @@
         </p:blipFill>
         <p:spPr>
           <a:xfrm>
-            <a:off x="1728667" y="6668888"/>
-            <a:ext cx="5357933" cy="3869619"/>
+            <a:off x="1584619" y="6570355"/>
+            <a:ext cx="4911439" cy="3547151"/>
           </a:xfrm>
           <a:prstGeom prst="rect">
             <a:avLst/>
@@ -6092,6 +6014,171 @@
           </a:ln>
         </p:spPr>
       </p:pic>
+      <p:sp>
+        <p:nvSpPr>
+          <p:cNvPr id="25" name="Rectangle 34"/>
+          <p:cNvSpPr>
+            <a:spLocks noChangeArrowheads="1"/>
+          </p:cNvSpPr>
+          <p:nvPr/>
+        </p:nvSpPr>
+        <p:spPr bwMode="auto">
+          <a:xfrm>
+            <a:off x="30162104" y="5207000"/>
+            <a:ext cx="9010650" cy="8731250"/>
+          </a:xfrm>
+          <a:prstGeom prst="rect">
+            <a:avLst/>
+          </a:prstGeom>
+          <a:solidFill>
+            <a:schemeClr val="bg1"/>
+          </a:solidFill>
+          <a:ln>
+            <a:noFill/>
+          </a:ln>
+          <a:extLst>
+            <a:ext uri="{91240B29-F687-4F45-9708-019B960494DF}">
+              <a14:hiddenLine xmlns:a14="http://schemas.microsoft.com/office/drawing/2010/main" w="9525">
+                <a:solidFill>
+                  <a:srgbClr val="000000"/>
+                </a:solidFill>
+                <a:miter lim="800000"/>
+                <a:headEnd/>
+                <a:tailEnd/>
+              </a14:hiddenLine>
+            </a:ext>
+          </a:extLst>
+        </p:spPr>
+        <p:txBody>
+          <a:bodyPr lIns="330000" tIns="330000" rIns="330000" bIns="330000"/>
+          <a:lstStyle>
+            <a:lvl1pPr eaLnBrk="0" hangingPunct="0">
+              <a:defRPr sz="8600">
+                <a:solidFill>
+                  <a:schemeClr val="tx1"/>
+                </a:solidFill>
+                <a:latin typeface="Arial" charset="0"/>
+                <a:ea typeface="ＭＳ Ｐゴシック" charset="-128"/>
+              </a:defRPr>
+            </a:lvl1pPr>
+            <a:lvl2pPr marL="742950" indent="-285750" eaLnBrk="0" hangingPunct="0">
+              <a:defRPr sz="8600">
+                <a:solidFill>
+                  <a:schemeClr val="tx1"/>
+                </a:solidFill>
+                <a:latin typeface="Arial" charset="0"/>
+                <a:ea typeface="ＭＳ Ｐゴシック" charset="-128"/>
+              </a:defRPr>
+            </a:lvl2pPr>
+            <a:lvl3pPr marL="1143000" indent="-228600" eaLnBrk="0" hangingPunct="0">
+              <a:defRPr sz="8600">
+                <a:solidFill>
+                  <a:schemeClr val="tx1"/>
+                </a:solidFill>
+                <a:latin typeface="Arial" charset="0"/>
+                <a:ea typeface="ＭＳ Ｐゴシック" charset="-128"/>
+              </a:defRPr>
+            </a:lvl3pPr>
+            <a:lvl4pPr marL="1600200" indent="-228600" eaLnBrk="0" hangingPunct="0">
+              <a:defRPr sz="8600">
+                <a:solidFill>
+                  <a:schemeClr val="tx1"/>
+                </a:solidFill>
+                <a:latin typeface="Arial" charset="0"/>
+                <a:ea typeface="ＭＳ Ｐゴシック" charset="-128"/>
+              </a:defRPr>
+            </a:lvl4pPr>
+            <a:lvl5pPr marL="2057400" indent="-228600" eaLnBrk="0" hangingPunct="0">
+              <a:defRPr sz="8600">
+                <a:solidFill>
+                  <a:schemeClr val="tx1"/>
+                </a:solidFill>
+                <a:latin typeface="Arial" charset="0"/>
+                <a:ea typeface="ＭＳ Ｐゴシック" charset="-128"/>
+              </a:defRPr>
+            </a:lvl5pPr>
+            <a:lvl6pPr marL="2514600" indent="-228600" defTabSz="2193925" eaLnBrk="0" fontAlgn="base" hangingPunct="0">
+              <a:spcBef>
+                <a:spcPct val="0"/>
+              </a:spcBef>
+              <a:spcAft>
+                <a:spcPct val="0"/>
+              </a:spcAft>
+              <a:defRPr sz="8600">
+                <a:solidFill>
+                  <a:schemeClr val="tx1"/>
+                </a:solidFill>
+                <a:latin typeface="Arial" charset="0"/>
+                <a:ea typeface="ＭＳ Ｐゴシック" charset="-128"/>
+              </a:defRPr>
+            </a:lvl6pPr>
+            <a:lvl7pPr marL="2971800" indent="-228600" defTabSz="2193925" eaLnBrk="0" fontAlgn="base" hangingPunct="0">
+              <a:spcBef>
+                <a:spcPct val="0"/>
+              </a:spcBef>
+              <a:spcAft>
+                <a:spcPct val="0"/>
+              </a:spcAft>
+              <a:defRPr sz="8600">
+                <a:solidFill>
+                  <a:schemeClr val="tx1"/>
+                </a:solidFill>
+                <a:latin typeface="Arial" charset="0"/>
+                <a:ea typeface="ＭＳ Ｐゴシック" charset="-128"/>
+              </a:defRPr>
+            </a:lvl7pPr>
+            <a:lvl8pPr marL="3429000" indent="-228600" defTabSz="2193925" eaLnBrk="0" fontAlgn="base" hangingPunct="0">
+              <a:spcBef>
+                <a:spcPct val="0"/>
+              </a:spcBef>
+              <a:spcAft>
+                <a:spcPct val="0"/>
+              </a:spcAft>
+              <a:defRPr sz="8600">
+                <a:solidFill>
+                  <a:schemeClr val="tx1"/>
+                </a:solidFill>
+                <a:latin typeface="Arial" charset="0"/>
+                <a:ea typeface="ＭＳ Ｐゴシック" charset="-128"/>
+              </a:defRPr>
+            </a:lvl8pPr>
+            <a:lvl9pPr marL="3886200" indent="-228600" defTabSz="2193925" eaLnBrk="0" fontAlgn="base" hangingPunct="0">
+              <a:spcBef>
+                <a:spcPct val="0"/>
+              </a:spcBef>
+              <a:spcAft>
+                <a:spcPct val="0"/>
+              </a:spcAft>
+              <a:defRPr sz="8600">
+                <a:solidFill>
+                  <a:schemeClr val="tx1"/>
+                </a:solidFill>
+                <a:latin typeface="Arial" charset="0"/>
+                <a:ea typeface="ＭＳ Ｐゴシック" charset="-128"/>
+              </a:defRPr>
+            </a:lvl9pPr>
+          </a:lstStyle>
+          <a:p>
+            <a:pPr eaLnBrk="1" hangingPunct="1">
+              <a:spcBef>
+                <a:spcPct val="50000"/>
+              </a:spcBef>
+            </a:pPr>
+            <a:r>
+              <a:rPr lang="en-GB" altLang="x-none" sz="3667" b="1" u="sng" dirty="0">
+                <a:solidFill>
+                  <a:srgbClr val="131F33"/>
+                </a:solidFill>
+              </a:rPr>
+              <a:t>RESULTS (CONTINUED)</a:t>
+            </a:r>
+          </a:p>
+          <a:p>
+            <a:pPr eaLnBrk="1" hangingPunct="1"/>
+            <a:endParaRPr lang="en-US" altLang="x-none" sz="2567" dirty="0"/>
+          </a:p>
+        </p:txBody>
+      </p:sp>
     </p:spTree>
   </p:cSld>
   <p:clrMapOvr>
@@ -6134,8 +6221,8 @@
         </p:nvSpPr>
         <p:spPr bwMode="auto">
           <a:xfrm>
-            <a:off x="14712743" y="18690535"/>
-            <a:ext cx="5399087" cy="3598863"/>
+            <a:off x="13486689" y="17590194"/>
+            <a:ext cx="4949163" cy="3298958"/>
           </a:xfrm>
           <a:prstGeom prst="rect">
             <a:avLst/>
@@ -6263,7 +6350,7 @@
           </a:lstStyle>
           <a:p>
             <a:pPr eaLnBrk="1" hangingPunct="1"/>
-            <a:endParaRPr lang="x-none" altLang="x-none"/>
+            <a:endParaRPr lang="x-none" altLang="x-none" sz="7885"/>
           </a:p>
         </p:txBody>
       </p:sp>
@@ -6277,8 +6364,8 @@
         </p:nvSpPr>
         <p:spPr bwMode="auto">
           <a:xfrm>
-            <a:off x="22783800" y="26276300"/>
-            <a:ext cx="8915400" cy="3598863"/>
+            <a:off x="20885150" y="24543811"/>
+            <a:ext cx="8172450" cy="3298958"/>
           </a:xfrm>
           <a:prstGeom prst="rect">
             <a:avLst/>
@@ -6406,7 +6493,7 @@
           </a:lstStyle>
           <a:p>
             <a:pPr eaLnBrk="1" hangingPunct="1"/>
-            <a:endParaRPr lang="x-none" altLang="x-none"/>
+            <a:endParaRPr lang="x-none" altLang="x-none" sz="7885"/>
           </a:p>
         </p:txBody>
       </p:sp>
@@ -6420,8 +6507,8 @@
         </p:nvSpPr>
         <p:spPr bwMode="auto">
           <a:xfrm>
-            <a:off x="22783800" y="21996400"/>
-            <a:ext cx="5399088" cy="3598863"/>
+            <a:off x="20885150" y="20620573"/>
+            <a:ext cx="4949164" cy="3298958"/>
           </a:xfrm>
           <a:prstGeom prst="rect">
             <a:avLst/>
@@ -6549,7 +6636,7 @@
           </a:lstStyle>
           <a:p>
             <a:pPr eaLnBrk="1" hangingPunct="1"/>
-            <a:endParaRPr lang="x-none" altLang="x-none"/>
+            <a:endParaRPr lang="x-none" altLang="x-none" sz="7885"/>
           </a:p>
         </p:txBody>
       </p:sp>
@@ -6563,8 +6650,8 @@
         </p:nvSpPr>
         <p:spPr bwMode="auto">
           <a:xfrm>
-            <a:off x="28194000" y="21790025"/>
-            <a:ext cx="3505200" cy="2825750"/>
+            <a:off x="25844500" y="20431400"/>
+            <a:ext cx="3213100" cy="2589738"/>
           </a:xfrm>
           <a:prstGeom prst="rect">
             <a:avLst/>
@@ -6594,7 +6681,7 @@
           </a:extLst>
         </p:spPr>
         <p:txBody>
-          <a:bodyPr lIns="180000" tIns="180000" rIns="180000" bIns="180000">
+          <a:bodyPr lIns="165000" tIns="165000" rIns="165000" bIns="165000">
             <a:spAutoFit/>
           </a:bodyPr>
           <a:lstStyle>
@@ -6707,21 +6794,21 @@
           <a:p>
             <a:pPr eaLnBrk="1" hangingPunct="1"/>
             <a:r>
-              <a:rPr lang="en-AU" altLang="x-none" sz="2000" i="1"/>
+              <a:rPr lang="en-AU" altLang="x-none" sz="1833" i="1"/>
               <a:t>Captions set in a serif style font such as Times, 18 to 24 size, italic style. </a:t>
             </a:r>
           </a:p>
           <a:p>
             <a:pPr eaLnBrk="1" hangingPunct="1"/>
-            <a:endParaRPr lang="en-AU" altLang="x-none" sz="2000" i="1"/>
+            <a:endParaRPr lang="en-AU" altLang="x-none" sz="1833" i="1"/>
           </a:p>
           <a:p>
             <a:pPr eaLnBrk="1" hangingPunct="1"/>
             <a:r>
-              <a:rPr lang="en-US" altLang="x-none" sz="2000" i="1"/>
+              <a:rPr lang="en-US" altLang="x-none" sz="1833" i="1"/>
               <a:t>Duis autem vel eum iriure dolor in hendrerit in vulputate velit esse molestie consequat.</a:t>
             </a:r>
-            <a:endParaRPr lang="en-AU" altLang="x-none" sz="2000" i="1"/>
+            <a:endParaRPr lang="en-AU" altLang="x-none" sz="1833" i="1"/>
           </a:p>
         </p:txBody>
       </p:sp>
@@ -6735,8 +6822,8 @@
         </p:nvSpPr>
         <p:spPr bwMode="auto">
           <a:xfrm>
-            <a:off x="12192000" y="26276300"/>
-            <a:ext cx="8915400" cy="3598863"/>
+            <a:off x="11176000" y="24543811"/>
+            <a:ext cx="8172450" cy="3298958"/>
           </a:xfrm>
           <a:prstGeom prst="rect">
             <a:avLst/>
@@ -6864,7 +6951,7 @@
           </a:lstStyle>
           <a:p>
             <a:pPr eaLnBrk="1" hangingPunct="1"/>
-            <a:endParaRPr lang="x-none" altLang="x-none"/>
+            <a:endParaRPr lang="x-none" altLang="x-none" sz="7885"/>
           </a:p>
         </p:txBody>
       </p:sp>
@@ -6878,8 +6965,8 @@
         </p:nvSpPr>
         <p:spPr bwMode="auto">
           <a:xfrm>
-            <a:off x="22794913" y="17724438"/>
-            <a:ext cx="5399087" cy="3598862"/>
+            <a:off x="20895344" y="16704601"/>
+            <a:ext cx="4949163" cy="3298957"/>
           </a:xfrm>
           <a:prstGeom prst="rect">
             <a:avLst/>
@@ -7007,7 +7094,7 @@
           </a:lstStyle>
           <a:p>
             <a:pPr eaLnBrk="1" hangingPunct="1"/>
-            <a:endParaRPr lang="x-none" altLang="x-none"/>
+            <a:endParaRPr lang="x-none" altLang="x-none" sz="7885"/>
           </a:p>
         </p:txBody>
       </p:sp>
@@ -7021,8 +7108,8 @@
         </p:nvSpPr>
         <p:spPr bwMode="auto">
           <a:xfrm>
-            <a:off x="28205113" y="17518063"/>
-            <a:ext cx="3505200" cy="2825750"/>
+            <a:off x="25854687" y="16515435"/>
+            <a:ext cx="3213100" cy="2589738"/>
           </a:xfrm>
           <a:prstGeom prst="rect">
             <a:avLst/>
@@ -7052,7 +7139,7 @@
           </a:extLst>
         </p:spPr>
         <p:txBody>
-          <a:bodyPr lIns="180000" tIns="180000" rIns="180000" bIns="180000">
+          <a:bodyPr lIns="165000" tIns="165000" rIns="165000" bIns="165000">
             <a:spAutoFit/>
           </a:bodyPr>
           <a:lstStyle>
@@ -7165,21 +7252,21 @@
           <a:p>
             <a:pPr eaLnBrk="1" hangingPunct="1"/>
             <a:r>
-              <a:rPr lang="en-AU" altLang="x-none" sz="2000" i="1"/>
+              <a:rPr lang="en-AU" altLang="x-none" sz="1833" i="1"/>
               <a:t>Captions set in a serif style font such as Times, 18 to 24 size, italic style. </a:t>
             </a:r>
           </a:p>
           <a:p>
             <a:pPr eaLnBrk="1" hangingPunct="1"/>
-            <a:endParaRPr lang="en-AU" altLang="x-none" sz="2000" i="1"/>
+            <a:endParaRPr lang="en-AU" altLang="x-none" sz="1833" i="1"/>
           </a:p>
           <a:p>
             <a:pPr eaLnBrk="1" hangingPunct="1"/>
             <a:r>
-              <a:rPr lang="en-US" altLang="x-none" sz="2000" i="1"/>
+              <a:rPr lang="en-US" altLang="x-none" sz="1833" i="1"/>
               <a:t>Duis autem vel eum iriure dolor in hendrerit in vulputate velit esse molestie consequat.</a:t>
             </a:r>
-            <a:endParaRPr lang="en-AU" altLang="x-none" sz="2000" i="1"/>
+            <a:endParaRPr lang="en-AU" altLang="x-none" sz="1833" i="1"/>
           </a:p>
         </p:txBody>
       </p:sp>

</xml_diff>